<commit_message>
adding changes and updated locations file
</commit_message>
<xml_diff>
--- a/work/kat/Predictive Pandas Presentation.pptx
+++ b/work/kat/Predictive Pandas Presentation.pptx
@@ -4,6 +4,9 @@
   <p:sldMasterIdLst>
     <p:sldMasterId id="2147483738" r:id="rId1"/>
   </p:sldMasterIdLst>
+  <p:notesMasterIdLst>
+    <p:notesMasterId r:id="rId17"/>
+  </p:notesMasterIdLst>
   <p:sldIdLst>
     <p:sldId id="256" r:id="rId2"/>
     <p:sldId id="257" r:id="rId3"/>
@@ -122,6 +125,9 @@
     <p:ext uri="{EFAFB233-063F-42B5-8137-9DF3F51BA10A}">
       <p15:sldGuideLst xmlns:p15="http://schemas.microsoft.com/office/powerpoint/2012/main"/>
     </p:ext>
+    <p:ext uri="{2D200454-40CA-4A62-9FC3-DE9A4176ACB9}">
+      <p15:notesGuideLst xmlns:p15="http://schemas.microsoft.com/office/powerpoint/2012/main"/>
+    </p:ext>
   </p:extLst>
 </p:presentation>
 </file>
@@ -129,7 +135,7 @@
 <file path=ppt/revisionInfo.xml><?xml version="1.0" encoding="utf-8"?>
 <p1510:revInfo xmlns:a="http://schemas.openxmlformats.org/drawingml/2006/main" xmlns:r="http://schemas.openxmlformats.org/officeDocument/2006/relationships" xmlns:p1510="http://schemas.microsoft.com/office/powerpoint/2015/10/main">
   <p1510:revLst>
-    <p1510:client id="{2E310BD6-DA8E-4AB2-9548-94C2AF5300BF}" v="15" dt="2020-10-20T10:19:41.654"/>
+    <p1510:client id="{2E310BD6-DA8E-4AB2-9548-94C2AF5300BF}" v="295" dt="2020-10-24T03:06:38.868"/>
   </p1510:revLst>
 </p1510:revInfo>
 </file>
@@ -139,27 +145,91 @@
   <pc:docChgLst>
     <pc:chgData name="Katherine Shamai" userId="1d9b402b02511d1e" providerId="LiveId" clId="{2E310BD6-DA8E-4AB2-9548-94C2AF5300BF}"/>
     <pc:docChg chg="undo custSel mod addSld modSld">
-      <pc:chgData name="Katherine Shamai" userId="1d9b402b02511d1e" providerId="LiveId" clId="{2E310BD6-DA8E-4AB2-9548-94C2AF5300BF}" dt="2020-10-20T11:16:22.343" v="706" actId="20577"/>
+      <pc:chgData name="Katherine Shamai" userId="1d9b402b02511d1e" providerId="LiveId" clId="{2E310BD6-DA8E-4AB2-9548-94C2AF5300BF}" dt="2020-10-24T03:08:31.930" v="1579" actId="20577"/>
       <pc:docMkLst>
         <pc:docMk/>
       </pc:docMkLst>
-      <pc:sldChg chg="modSp setBg">
-        <pc:chgData name="Katherine Shamai" userId="1d9b402b02511d1e" providerId="LiveId" clId="{2E310BD6-DA8E-4AB2-9548-94C2AF5300BF}" dt="2020-10-20T10:19:41.654" v="419"/>
+      <pc:sldChg chg="addSp delSp modSp mod setBg">
+        <pc:chgData name="Katherine Shamai" userId="1d9b402b02511d1e" providerId="LiveId" clId="{2E310BD6-DA8E-4AB2-9548-94C2AF5300BF}" dt="2020-10-24T02:57:53.702" v="1407" actId="207"/>
         <pc:sldMkLst>
           <pc:docMk/>
           <pc:sldMk cId="3555433141" sldId="256"/>
         </pc:sldMkLst>
-        <pc:spChg chg="mod">
-          <ac:chgData name="Katherine Shamai" userId="1d9b402b02511d1e" providerId="LiveId" clId="{2E310BD6-DA8E-4AB2-9548-94C2AF5300BF}" dt="2020-10-20T10:03:49.074" v="11"/>
+        <pc:spChg chg="del mod">
+          <ac:chgData name="Katherine Shamai" userId="1d9b402b02511d1e" providerId="LiveId" clId="{2E310BD6-DA8E-4AB2-9548-94C2AF5300BF}" dt="2020-10-24T02:48:08.522" v="1138" actId="478"/>
           <ac:spMkLst>
             <pc:docMk/>
             <pc:sldMk cId="3555433141" sldId="256"/>
             <ac:spMk id="2" creationId="{FEBA3F05-B368-43A7-8E01-284B2F2E4A58}"/>
           </ac:spMkLst>
         </pc:spChg>
+        <pc:spChg chg="mod">
+          <ac:chgData name="Katherine Shamai" userId="1d9b402b02511d1e" providerId="LiveId" clId="{2E310BD6-DA8E-4AB2-9548-94C2AF5300BF}" dt="2020-10-24T02:57:25.874" v="1406" actId="207"/>
+          <ac:spMkLst>
+            <pc:docMk/>
+            <pc:sldMk cId="3555433141" sldId="256"/>
+            <ac:spMk id="3" creationId="{4EACDE74-2BC4-4573-9E53-3FBECBE0C479}"/>
+          </ac:spMkLst>
+        </pc:spChg>
+        <pc:spChg chg="mod">
+          <ac:chgData name="Katherine Shamai" userId="1d9b402b02511d1e" providerId="LiveId" clId="{2E310BD6-DA8E-4AB2-9548-94C2AF5300BF}" dt="2020-10-24T02:57:53.702" v="1407" actId="207"/>
+          <ac:spMkLst>
+            <pc:docMk/>
+            <pc:sldMk cId="3555433141" sldId="256"/>
+            <ac:spMk id="4" creationId="{5A8AF05F-FB47-49ED-AA7F-493FDBF7E1FD}"/>
+          </ac:spMkLst>
+        </pc:spChg>
+        <pc:spChg chg="add mod">
+          <ac:chgData name="Katherine Shamai" userId="1d9b402b02511d1e" providerId="LiveId" clId="{2E310BD6-DA8E-4AB2-9548-94C2AF5300BF}" dt="2020-10-24T02:57:53.702" v="1407" actId="207"/>
+          <ac:spMkLst>
+            <pc:docMk/>
+            <pc:sldMk cId="3555433141" sldId="256"/>
+            <ac:spMk id="6" creationId="{3FE66EA3-78A2-484E-85F0-15436EFCB3DD}"/>
+          </ac:spMkLst>
+        </pc:spChg>
+        <pc:spChg chg="add del mod">
+          <ac:chgData name="Katherine Shamai" userId="1d9b402b02511d1e" providerId="LiveId" clId="{2E310BD6-DA8E-4AB2-9548-94C2AF5300BF}" dt="2020-10-24T02:48:10.972" v="1139" actId="478"/>
+          <ac:spMkLst>
+            <pc:docMk/>
+            <pc:sldMk cId="3555433141" sldId="256"/>
+            <ac:spMk id="8" creationId="{58BF93B1-2384-49FC-A17A-A429CCD00D7B}"/>
+          </ac:spMkLst>
+        </pc:spChg>
+        <pc:spChg chg="add del">
+          <ac:chgData name="Katherine Shamai" userId="1d9b402b02511d1e" providerId="LiveId" clId="{2E310BD6-DA8E-4AB2-9548-94C2AF5300BF}" dt="2020-10-24T02:48:30.225" v="1145" actId="26606"/>
+          <ac:spMkLst>
+            <pc:docMk/>
+            <pc:sldMk cId="3555433141" sldId="256"/>
+            <ac:spMk id="15" creationId="{822F50EE-F19F-4D89-A39D-4F3345F16FA5}"/>
+          </ac:spMkLst>
+        </pc:spChg>
+        <pc:spChg chg="add del">
+          <ac:chgData name="Katherine Shamai" userId="1d9b402b02511d1e" providerId="LiveId" clId="{2E310BD6-DA8E-4AB2-9548-94C2AF5300BF}" dt="2020-10-24T02:48:36.629" v="1149" actId="26606"/>
+          <ac:spMkLst>
+            <pc:docMk/>
+            <pc:sldMk cId="3555433141" sldId="256"/>
+            <ac:spMk id="19" creationId="{DDDBF26D-B974-4340-9673-A078090243EC}"/>
+          </ac:spMkLst>
+        </pc:spChg>
+        <pc:picChg chg="add mod ord">
+          <ac:chgData name="Katherine Shamai" userId="1d9b402b02511d1e" providerId="LiveId" clId="{2E310BD6-DA8E-4AB2-9548-94C2AF5300BF}" dt="2020-10-24T02:48:52.809" v="1154" actId="1076"/>
+          <ac:picMkLst>
+            <pc:docMk/>
+            <pc:sldMk cId="3555433141" sldId="256"/>
+            <ac:picMk id="10" creationId="{467DDCFB-8F1B-4AB9-ABCC-5DFFE5F9838D}"/>
+          </ac:picMkLst>
+        </pc:picChg>
+        <pc:picChg chg="add del">
+          <ac:chgData name="Katherine Shamai" userId="1d9b402b02511d1e" providerId="LiveId" clId="{2E310BD6-DA8E-4AB2-9548-94C2AF5300BF}" dt="2020-10-24T02:48:32.416" v="1147" actId="26606"/>
+          <ac:picMkLst>
+            <pc:docMk/>
+            <pc:sldMk cId="3555433141" sldId="256"/>
+            <ac:picMk id="17" creationId="{A4A32627-6152-45D0-B80D-C3B0D22FE7D6}"/>
+          </ac:picMkLst>
+        </pc:picChg>
       </pc:sldChg>
-      <pc:sldChg chg="addSp delSp modSp mod setBg delDesignElem">
-        <pc:chgData name="Katherine Shamai" userId="1d9b402b02511d1e" providerId="LiveId" clId="{2E310BD6-DA8E-4AB2-9548-94C2AF5300BF}" dt="2020-10-20T10:04:03.883" v="12" actId="26606"/>
+      <pc:sldChg chg="addSp delSp modSp mod setBg delDesignElem modNotesTx">
+        <pc:chgData name="Katherine Shamai" userId="1d9b402b02511d1e" providerId="LiveId" clId="{2E310BD6-DA8E-4AB2-9548-94C2AF5300BF}" dt="2020-10-24T02:50:25.819" v="1203" actId="14100"/>
         <pc:sldMkLst>
           <pc:docMk/>
           <pc:sldMk cId="2903564347" sldId="257"/>
@@ -172,12 +242,28 @@
             <ac:spMk id="2" creationId="{82024D0E-EA7D-41A9-8C4D-345B29002CDB}"/>
           </ac:spMkLst>
         </pc:spChg>
+        <pc:spChg chg="add del mod">
+          <ac:chgData name="Katherine Shamai" userId="1d9b402b02511d1e" providerId="LiveId" clId="{2E310BD6-DA8E-4AB2-9548-94C2AF5300BF}" dt="2020-10-24T00:57:28.248" v="1032" actId="478"/>
+          <ac:spMkLst>
+            <pc:docMk/>
+            <pc:sldMk cId="2903564347" sldId="257"/>
+            <ac:spMk id="3" creationId="{04BE82CA-2C64-43E4-BE26-D572BC944001}"/>
+          </ac:spMkLst>
+        </pc:spChg>
         <pc:spChg chg="del mod">
           <ac:chgData name="Katherine Shamai" userId="1d9b402b02511d1e" providerId="LiveId" clId="{2E310BD6-DA8E-4AB2-9548-94C2AF5300BF}" dt="2020-10-20T10:04:03.883" v="12" actId="26606"/>
           <ac:spMkLst>
             <pc:docMk/>
             <pc:sldMk cId="2903564347" sldId="257"/>
             <ac:spMk id="3" creationId="{352C1770-A179-4858-BEC4-74E28CECAD33}"/>
+          </ac:spMkLst>
+        </pc:spChg>
+        <pc:spChg chg="add mod">
+          <ac:chgData name="Katherine Shamai" userId="1d9b402b02511d1e" providerId="LiveId" clId="{2E310BD6-DA8E-4AB2-9548-94C2AF5300BF}" dt="2020-10-24T00:57:35.210" v="1033" actId="1076"/>
+          <ac:spMkLst>
+            <pc:docMk/>
+            <pc:sldMk cId="2903564347" sldId="257"/>
+            <ac:spMk id="6" creationId="{A848F25A-C42F-443B-B984-F1B714A9D64C}"/>
           </ac:spMkLst>
         </pc:spChg>
         <pc:spChg chg="del">
@@ -188,14 +274,22 @@
             <ac:spMk id="8" creationId="{4351DFE5-F63D-4BE0-BDA9-E3EB88F01AA5}"/>
           </ac:spMkLst>
         </pc:spChg>
-        <pc:graphicFrameChg chg="add">
-          <ac:chgData name="Katherine Shamai" userId="1d9b402b02511d1e" providerId="LiveId" clId="{2E310BD6-DA8E-4AB2-9548-94C2AF5300BF}" dt="2020-10-20T10:04:03.883" v="12" actId="26606"/>
+        <pc:graphicFrameChg chg="add mod">
+          <ac:chgData name="Katherine Shamai" userId="1d9b402b02511d1e" providerId="LiveId" clId="{2E310BD6-DA8E-4AB2-9548-94C2AF5300BF}" dt="2020-10-24T02:50:25.819" v="1203" actId="14100"/>
           <ac:graphicFrameMkLst>
             <pc:docMk/>
             <pc:sldMk cId="2903564347" sldId="257"/>
             <ac:graphicFrameMk id="5" creationId="{0E6A085C-4D40-400F-A5B9-2DBB6A5DD117}"/>
           </ac:graphicFrameMkLst>
         </pc:graphicFrameChg>
+        <pc:picChg chg="add mod">
+          <ac:chgData name="Katherine Shamai" userId="1d9b402b02511d1e" providerId="LiveId" clId="{2E310BD6-DA8E-4AB2-9548-94C2AF5300BF}" dt="2020-10-24T00:57:35.210" v="1033" actId="1076"/>
+          <ac:picMkLst>
+            <pc:docMk/>
+            <pc:sldMk cId="2903564347" sldId="257"/>
+            <ac:picMk id="4" creationId="{58554E4C-9C9F-4D63-9022-5133D50835B8}"/>
+          </ac:picMkLst>
+        </pc:picChg>
         <pc:picChg chg="add">
           <ac:chgData name="Katherine Shamai" userId="1d9b402b02511d1e" providerId="LiveId" clId="{2E310BD6-DA8E-4AB2-9548-94C2AF5300BF}" dt="2020-10-20T10:04:03.883" v="12" actId="26606"/>
           <ac:picMkLst>
@@ -212,9 +306,17 @@
             <ac:picMk id="10" creationId="{3AA16612-ACD2-4A16-8F2B-4514FD6BF28F}"/>
           </ac:picMkLst>
         </pc:picChg>
+        <pc:picChg chg="add del mod">
+          <ac:chgData name="Katherine Shamai" userId="1d9b402b02511d1e" providerId="LiveId" clId="{2E310BD6-DA8E-4AB2-9548-94C2AF5300BF}" dt="2020-10-24T00:57:28.248" v="1032" actId="478"/>
+          <ac:picMkLst>
+            <pc:docMk/>
+            <pc:sldMk cId="2903564347" sldId="257"/>
+            <ac:picMk id="1026" creationId="{E069D3A5-6A39-4828-B0DF-602122BA8B63}"/>
+          </ac:picMkLst>
+        </pc:picChg>
       </pc:sldChg>
       <pc:sldChg chg="addSp delSp modSp mod setBg setClrOvrMap">
-        <pc:chgData name="Katherine Shamai" userId="1d9b402b02511d1e" providerId="LiveId" clId="{2E310BD6-DA8E-4AB2-9548-94C2AF5300BF}" dt="2020-10-20T10:06:26.415" v="213" actId="26606"/>
+        <pc:chgData name="Katherine Shamai" userId="1d9b402b02511d1e" providerId="LiveId" clId="{2E310BD6-DA8E-4AB2-9548-94C2AF5300BF}" dt="2020-10-24T03:08:31.930" v="1579" actId="20577"/>
         <pc:sldMkLst>
           <pc:docMk/>
           <pc:sldMk cId="2674753213" sldId="258"/>
@@ -228,7 +330,7 @@
           </ac:spMkLst>
         </pc:spChg>
         <pc:spChg chg="mod">
-          <ac:chgData name="Katherine Shamai" userId="1d9b402b02511d1e" providerId="LiveId" clId="{2E310BD6-DA8E-4AB2-9548-94C2AF5300BF}" dt="2020-10-20T10:06:26.415" v="213" actId="26606"/>
+          <ac:chgData name="Katherine Shamai" userId="1d9b402b02511d1e" providerId="LiveId" clId="{2E310BD6-DA8E-4AB2-9548-94C2AF5300BF}" dt="2020-10-24T03:08:31.930" v="1579" actId="20577"/>
           <ac:spMkLst>
             <pc:docMk/>
             <pc:sldMk cId="2674753213" sldId="258"/>
@@ -317,13 +419,13 @@
         </pc:cxnChg>
       </pc:sldChg>
       <pc:sldChg chg="addSp delSp modSp new mod setBg">
-        <pc:chgData name="Katherine Shamai" userId="1d9b402b02511d1e" providerId="LiveId" clId="{2E310BD6-DA8E-4AB2-9548-94C2AF5300BF}" dt="2020-10-20T10:05:16.704" v="128" actId="26606"/>
+        <pc:chgData name="Katherine Shamai" userId="1d9b402b02511d1e" providerId="LiveId" clId="{2E310BD6-DA8E-4AB2-9548-94C2AF5300BF}" dt="2020-10-24T03:06:38.867" v="1478"/>
         <pc:sldMkLst>
           <pc:docMk/>
           <pc:sldMk cId="3809420474" sldId="259"/>
         </pc:sldMkLst>
         <pc:spChg chg="mod">
-          <ac:chgData name="Katherine Shamai" userId="1d9b402b02511d1e" providerId="LiveId" clId="{2E310BD6-DA8E-4AB2-9548-94C2AF5300BF}" dt="2020-10-20T10:05:16.704" v="128" actId="26606"/>
+          <ac:chgData name="Katherine Shamai" userId="1d9b402b02511d1e" providerId="LiveId" clId="{2E310BD6-DA8E-4AB2-9548-94C2AF5300BF}" dt="2020-10-24T02:52:06.624" v="1322" actId="20577"/>
           <ac:spMkLst>
             <pc:docMk/>
             <pc:sldMk cId="3809420474" sldId="259"/>
@@ -338,14 +440,30 @@
             <ac:spMk id="3" creationId="{ED13102A-6651-4C22-84A6-1A7024F9BB01}"/>
           </ac:spMkLst>
         </pc:spChg>
-        <pc:graphicFrameChg chg="add">
-          <ac:chgData name="Katherine Shamai" userId="1d9b402b02511d1e" providerId="LiveId" clId="{2E310BD6-DA8E-4AB2-9548-94C2AF5300BF}" dt="2020-10-20T10:05:16.704" v="128" actId="26606"/>
+        <pc:spChg chg="add mod">
+          <ac:chgData name="Katherine Shamai" userId="1d9b402b02511d1e" providerId="LiveId" clId="{2E310BD6-DA8E-4AB2-9548-94C2AF5300BF}" dt="2020-10-24T00:56:26.235" v="1016" actId="1076"/>
+          <ac:spMkLst>
+            <pc:docMk/>
+            <pc:sldMk cId="3809420474" sldId="259"/>
+            <ac:spMk id="4" creationId="{C3369C1F-E41D-433D-99AE-CA8CBB221662}"/>
+          </ac:spMkLst>
+        </pc:spChg>
+        <pc:graphicFrameChg chg="add mod">
+          <ac:chgData name="Katherine Shamai" userId="1d9b402b02511d1e" providerId="LiveId" clId="{2E310BD6-DA8E-4AB2-9548-94C2AF5300BF}" dt="2020-10-24T03:06:38.867" v="1478"/>
           <ac:graphicFrameMkLst>
             <pc:docMk/>
             <pc:sldMk cId="3809420474" sldId="259"/>
             <ac:graphicFrameMk id="5" creationId="{16A22D98-3958-4AF9-9A8F-9728949F7AAF}"/>
           </ac:graphicFrameMkLst>
         </pc:graphicFrameChg>
+        <pc:picChg chg="add mod">
+          <ac:chgData name="Katherine Shamai" userId="1d9b402b02511d1e" providerId="LiveId" clId="{2E310BD6-DA8E-4AB2-9548-94C2AF5300BF}" dt="2020-10-24T00:56:07.859" v="1014" actId="14100"/>
+          <ac:picMkLst>
+            <pc:docMk/>
+            <pc:sldMk cId="3809420474" sldId="259"/>
+            <ac:picMk id="3" creationId="{726EC9C9-3BD3-4C13-BA3E-953FE7D1766E}"/>
+          </ac:picMkLst>
+        </pc:picChg>
         <pc:picChg chg="add">
           <ac:chgData name="Katherine Shamai" userId="1d9b402b02511d1e" providerId="LiveId" clId="{2E310BD6-DA8E-4AB2-9548-94C2AF5300BF}" dt="2020-10-20T10:05:16.704" v="128" actId="26606"/>
           <ac:picMkLst>
@@ -355,8 +473,8 @@
           </ac:picMkLst>
         </pc:picChg>
       </pc:sldChg>
-      <pc:sldChg chg="modSp new mod">
-        <pc:chgData name="Katherine Shamai" userId="1d9b402b02511d1e" providerId="LiveId" clId="{2E310BD6-DA8E-4AB2-9548-94C2AF5300BF}" dt="2020-10-20T11:16:22.343" v="706" actId="20577"/>
+      <pc:sldChg chg="modSp new mod modNotes">
+        <pc:chgData name="Katherine Shamai" userId="1d9b402b02511d1e" providerId="LiveId" clId="{2E310BD6-DA8E-4AB2-9548-94C2AF5300BF}" dt="2020-10-23T22:50:07.778" v="915" actId="255"/>
         <pc:sldMkLst>
           <pc:docMk/>
           <pc:sldMk cId="710680716" sldId="260"/>
@@ -484,7 +602,7 @@
         </pc:spChg>
       </pc:sldChg>
       <pc:sldChg chg="modSp new mod">
-        <pc:chgData name="Katherine Shamai" userId="1d9b402b02511d1e" providerId="LiveId" clId="{2E310BD6-DA8E-4AB2-9548-94C2AF5300BF}" dt="2020-10-20T10:08:44.816" v="406" actId="20577"/>
+        <pc:chgData name="Katherine Shamai" userId="1d9b402b02511d1e" providerId="LiveId" clId="{2E310BD6-DA8E-4AB2-9548-94C2AF5300BF}" dt="2020-10-23T22:47:29.021" v="911" actId="20577"/>
         <pc:sldMkLst>
           <pc:docMk/>
           <pc:sldMk cId="2873247580" sldId="268"/>
@@ -495,6 +613,14 @@
             <pc:docMk/>
             <pc:sldMk cId="2873247580" sldId="268"/>
             <ac:spMk id="2" creationId="{9167B0B5-5A3D-4710-AFF4-E1D4711B178E}"/>
+          </ac:spMkLst>
+        </pc:spChg>
+        <pc:spChg chg="mod">
+          <ac:chgData name="Katherine Shamai" userId="1d9b402b02511d1e" providerId="LiveId" clId="{2E310BD6-DA8E-4AB2-9548-94C2AF5300BF}" dt="2020-10-23T22:47:29.021" v="911" actId="20577"/>
+          <ac:spMkLst>
+            <pc:docMk/>
+            <pc:sldMk cId="2873247580" sldId="268"/>
+            <ac:spMk id="3" creationId="{79A708EC-D99B-4CCA-B587-788C279513A2}"/>
           </ac:spMkLst>
         </pc:spChg>
       </pc:sldChg>
@@ -513,8 +639,8 @@
           </ac:spMkLst>
         </pc:spChg>
       </pc:sldChg>
-      <pc:sldChg chg="modSp new mod">
-        <pc:chgData name="Katherine Shamai" userId="1d9b402b02511d1e" providerId="LiveId" clId="{2E310BD6-DA8E-4AB2-9548-94C2AF5300BF}" dt="2020-10-20T11:08:06.905" v="445" actId="20577"/>
+      <pc:sldChg chg="modSp new mod modNotes modNotesTx">
+        <pc:chgData name="Katherine Shamai" userId="1d9b402b02511d1e" providerId="LiveId" clId="{2E310BD6-DA8E-4AB2-9548-94C2AF5300BF}" dt="2020-10-24T03:07:32.605" v="1479"/>
         <pc:sldMkLst>
           <pc:docMk/>
           <pc:sldMk cId="1295893958" sldId="270"/>
@@ -2433,8 +2559,8 @@
         <a:lstStyle/>
         <a:p>
           <a:r>
-            <a:rPr lang="en-US"/>
-            <a:t>You can go the same old, same old but you’re probably tired of that since that’s all you’ve been drinking for the past 6 months</a:t>
+            <a:rPr lang="en-US" dirty="0"/>
+            <a:t>You can go with the same old, same old but you’re probably tired of that since that’s all you’ve been drinking for the past 6 months</a:t>
           </a:r>
         </a:p>
       </dgm:t>
@@ -2469,8 +2595,8 @@
         <a:lstStyle/>
         <a:p>
           <a:r>
-            <a:rPr lang="en-US"/>
-            <a:t>We thought it would be great to celebrate the world of craft beers and get Victorians to try something different and find a new favorite</a:t>
+            <a:rPr lang="en-US" dirty="0"/>
+            <a:t>We thought it would be great to celebrate the world of craft beers and get beer lovers to try something different and find a new favorite</a:t>
           </a:r>
         </a:p>
       </dgm:t>
@@ -2505,8 +2631,8 @@
         <a:lstStyle/>
         <a:p>
           <a:r>
-            <a:rPr lang="en-US"/>
-            <a:t>Using review data and data on breweries, we set out on a virtual brewery crawl to find good datasets to teach a computer how to appreciate a good craft beer</a:t>
+            <a:rPr lang="en-US" dirty="0"/>
+            <a:t>Using review data and data on breweries, we set out on a virtual brewery crawl to find good datasets and ways to teach a model how to appreciate a good craft beer, and recommend one</a:t>
           </a:r>
         </a:p>
       </dgm:t>
@@ -2789,7 +2915,7 @@
   <dgm:whole/>
   <dgm:extLst>
     <a:ext uri="http://schemas.microsoft.com/office/drawing/2008/diagram">
-      <dsp:dataModelExt xmlns:dsp="http://schemas.microsoft.com/office/drawing/2008/diagram" relId="rId8" minVer="http://schemas.openxmlformats.org/drawingml/2006/diagram"/>
+      <dsp:dataModelExt xmlns:dsp="http://schemas.microsoft.com/office/drawing/2008/diagram" relId="rId9" minVer="http://schemas.openxmlformats.org/drawingml/2006/diagram"/>
     </a:ext>
   </dgm:extLst>
 </dgm:dataModel>
@@ -2817,11 +2943,14 @@
         <a:lstStyle/>
         <a:p>
           <a:pPr>
+            <a:lnSpc>
+              <a:spcPct val="100000"/>
+            </a:lnSpc>
             <a:defRPr cap="all"/>
           </a:pPr>
           <a:r>
-            <a:rPr lang="en-US"/>
-            <a:t>From our search, we identified 2 data sets</a:t>
+            <a:rPr lang="en-US" dirty="0"/>
+            <a:t>From our search, we identified 3 data points which provided us with the information needed</a:t>
           </a:r>
         </a:p>
       </dgm:t>
@@ -2856,12 +2985,20 @@
         <a:lstStyle/>
         <a:p>
           <a:pPr>
+            <a:lnSpc>
+              <a:spcPct val="100000"/>
+            </a:lnSpc>
             <a:defRPr cap="all"/>
           </a:pPr>
           <a:r>
-            <a:rPr lang="en-US"/>
-            <a:t>Data set 1 – []</a:t>
+            <a:rPr lang="en-US" dirty="0"/>
+            <a:t>Data point 1 – </a:t>
           </a:r>
+          <a:r>
+            <a:rPr lang="en-US" dirty="0" err="1"/>
+            <a:t>Dataworld</a:t>
+          </a:r>
+          <a:endParaRPr lang="en-US" dirty="0"/>
         </a:p>
       </dgm:t>
     </dgm:pt>
@@ -2895,11 +3032,14 @@
         <a:lstStyle/>
         <a:p>
           <a:pPr>
+            <a:lnSpc>
+              <a:spcPct val="100000"/>
+            </a:lnSpc>
             <a:defRPr cap="all"/>
           </a:pPr>
           <a:r>
-            <a:rPr lang="en-US"/>
-            <a:t>Data set 2 – []</a:t>
+            <a:rPr lang="en-US" dirty="0"/>
+            <a:t>Data point 2 – BeerAdvocate Website</a:t>
           </a:r>
         </a:p>
       </dgm:t>
@@ -2926,6 +3066,48 @@
         </a:p>
       </dgm:t>
     </dgm:pt>
+    <dgm:pt modelId="{5C30A2A7-A465-4FC2-8835-C92138DB1BC6}">
+      <dgm:prSet/>
+      <dgm:spPr/>
+      <dgm:t>
+        <a:bodyPr/>
+        <a:lstStyle/>
+        <a:p>
+          <a:pPr>
+            <a:lnSpc>
+              <a:spcPct val="100000"/>
+            </a:lnSpc>
+            <a:defRPr cap="all"/>
+          </a:pPr>
+          <a:r>
+            <a:rPr lang="en-US" dirty="0"/>
+            <a:t>Data point 3 – Google API</a:t>
+          </a:r>
+        </a:p>
+      </dgm:t>
+    </dgm:pt>
+    <dgm:pt modelId="{AE9B696D-9936-44FC-B8EC-C80DD365CA7E}" type="parTrans" cxnId="{E4A7BC58-7BAA-4A7E-B48F-23CEAFA64DF6}">
+      <dgm:prSet/>
+      <dgm:spPr/>
+      <dgm:t>
+        <a:bodyPr/>
+        <a:lstStyle/>
+        <a:p>
+          <a:endParaRPr lang="en-AU"/>
+        </a:p>
+      </dgm:t>
+    </dgm:pt>
+    <dgm:pt modelId="{DAFF97CA-2D49-40A1-9F65-0616E9FD3660}" type="sibTrans" cxnId="{E4A7BC58-7BAA-4A7E-B48F-23CEAFA64DF6}">
+      <dgm:prSet/>
+      <dgm:spPr/>
+      <dgm:t>
+        <a:bodyPr/>
+        <a:lstStyle/>
+        <a:p>
+          <a:endParaRPr lang="en-AU"/>
+        </a:p>
+      </dgm:t>
+    </dgm:pt>
     <dgm:pt modelId="{C566BAE4-D7BC-4D8D-B6A3-83E54B2D1D9B}" type="pres">
       <dgm:prSet presAssocID="{9A595FE4-30C8-42FD-A223-0FFB15AEEB9A}" presName="root" presStyleCnt="0">
         <dgm:presLayoutVars>
@@ -2940,7 +3122,7 @@
       <dgm:spPr/>
     </dgm:pt>
     <dgm:pt modelId="{60BA88B1-DB94-46AB-B3A7-72B57AC30CC2}" type="pres">
-      <dgm:prSet presAssocID="{54A04A3B-5C3E-46BB-9552-96FFB9486C39}" presName="iconBgRect" presStyleLbl="bgShp" presStyleIdx="0" presStyleCnt="3"/>
+      <dgm:prSet presAssocID="{54A04A3B-5C3E-46BB-9552-96FFB9486C39}" presName="iconBgRect" presStyleLbl="bgShp" presStyleIdx="0" presStyleCnt="4"/>
       <dgm:spPr>
         <a:prstGeom prst="round2DiagRect">
           <a:avLst>
@@ -2951,7 +3133,7 @@
       </dgm:spPr>
     </dgm:pt>
     <dgm:pt modelId="{FCEB0706-DE07-40BE-884F-703F86244086}" type="pres">
-      <dgm:prSet presAssocID="{54A04A3B-5C3E-46BB-9552-96FFB9486C39}" presName="iconRect" presStyleLbl="node1" presStyleIdx="0" presStyleCnt="3"/>
+      <dgm:prSet presAssocID="{54A04A3B-5C3E-46BB-9552-96FFB9486C39}" presName="iconRect" presStyleLbl="node1" presStyleIdx="0" presStyleCnt="4"/>
       <dgm:spPr>
         <a:blipFill>
           <a:blip xmlns:r="http://schemas.openxmlformats.org/officeDocument/2006/relationships" r:embed="rId1">
@@ -2983,7 +3165,7 @@
       <dgm:spPr/>
     </dgm:pt>
     <dgm:pt modelId="{4745E08A-A058-44CB-8CE1-D9EA3C0173BA}" type="pres">
-      <dgm:prSet presAssocID="{54A04A3B-5C3E-46BB-9552-96FFB9486C39}" presName="textRect" presStyleLbl="revTx" presStyleIdx="0" presStyleCnt="3">
+      <dgm:prSet presAssocID="{54A04A3B-5C3E-46BB-9552-96FFB9486C39}" presName="textRect" presStyleLbl="revTx" presStyleIdx="0" presStyleCnt="4">
         <dgm:presLayoutVars>
           <dgm:chMax val="1"/>
           <dgm:chPref val="1"/>
@@ -3000,7 +3182,7 @@
       <dgm:spPr/>
     </dgm:pt>
     <dgm:pt modelId="{C049969C-CBB0-4814-A422-94756F300E87}" type="pres">
-      <dgm:prSet presAssocID="{13F8BAD6-C6DC-4207-B0E6-065B02D332A8}" presName="iconBgRect" presStyleLbl="bgShp" presStyleIdx="1" presStyleCnt="3"/>
+      <dgm:prSet presAssocID="{13F8BAD6-C6DC-4207-B0E6-065B02D332A8}" presName="iconBgRect" presStyleLbl="bgShp" presStyleIdx="1" presStyleCnt="4"/>
       <dgm:spPr>
         <a:prstGeom prst="round2DiagRect">
           <a:avLst>
@@ -3011,7 +3193,7 @@
       </dgm:spPr>
     </dgm:pt>
     <dgm:pt modelId="{B42BD0CD-7EF7-4887-BF45-B7A1622B0AFE}" type="pres">
-      <dgm:prSet presAssocID="{13F8BAD6-C6DC-4207-B0E6-065B02D332A8}" presName="iconRect" presStyleLbl="node1" presStyleIdx="1" presStyleCnt="3"/>
+      <dgm:prSet presAssocID="{13F8BAD6-C6DC-4207-B0E6-065B02D332A8}" presName="iconRect" presStyleLbl="node1" presStyleIdx="1" presStyleCnt="4"/>
       <dgm:spPr>
         <a:blipFill>
           <a:blip xmlns:r="http://schemas.openxmlformats.org/officeDocument/2006/relationships" r:embed="rId3">
@@ -3043,7 +3225,7 @@
       <dgm:spPr/>
     </dgm:pt>
     <dgm:pt modelId="{1EC521C1-B7D6-442E-913B-4044031AEDD0}" type="pres">
-      <dgm:prSet presAssocID="{13F8BAD6-C6DC-4207-B0E6-065B02D332A8}" presName="textRect" presStyleLbl="revTx" presStyleIdx="1" presStyleCnt="3">
+      <dgm:prSet presAssocID="{13F8BAD6-C6DC-4207-B0E6-065B02D332A8}" presName="textRect" presStyleLbl="revTx" presStyleIdx="1" presStyleCnt="4">
         <dgm:presLayoutVars>
           <dgm:chMax val="1"/>
           <dgm:chPref val="1"/>
@@ -3060,7 +3242,7 @@
       <dgm:spPr/>
     </dgm:pt>
     <dgm:pt modelId="{582167B2-8168-46D5-9650-BE2BD03B679C}" type="pres">
-      <dgm:prSet presAssocID="{4CDD30FF-E289-4844-AF3A-6932B43B01E6}" presName="iconBgRect" presStyleLbl="bgShp" presStyleIdx="2" presStyleCnt="3"/>
+      <dgm:prSet presAssocID="{4CDD30FF-E289-4844-AF3A-6932B43B01E6}" presName="iconBgRect" presStyleLbl="bgShp" presStyleIdx="2" presStyleCnt="4"/>
       <dgm:spPr>
         <a:prstGeom prst="round2DiagRect">
           <a:avLst>
@@ -3071,7 +3253,7 @@
       </dgm:spPr>
     </dgm:pt>
     <dgm:pt modelId="{C4ABF4E7-C759-47BD-9DAF-2C0517969725}" type="pres">
-      <dgm:prSet presAssocID="{4CDD30FF-E289-4844-AF3A-6932B43B01E6}" presName="iconRect" presStyleLbl="node1" presStyleIdx="2" presStyleCnt="3"/>
+      <dgm:prSet presAssocID="{4CDD30FF-E289-4844-AF3A-6932B43B01E6}" presName="iconRect" presStyleLbl="node1" presStyleIdx="2" presStyleCnt="4"/>
       <dgm:spPr>
         <a:blipFill>
           <a:blip xmlns:r="http://schemas.openxmlformats.org/officeDocument/2006/relationships" r:embed="rId5">
@@ -3103,7 +3285,65 @@
       <dgm:spPr/>
     </dgm:pt>
     <dgm:pt modelId="{5AD12752-8A9B-4BCC-BEE6-43EB0F39B5D8}" type="pres">
-      <dgm:prSet presAssocID="{4CDD30FF-E289-4844-AF3A-6932B43B01E6}" presName="textRect" presStyleLbl="revTx" presStyleIdx="2" presStyleCnt="3">
+      <dgm:prSet presAssocID="{4CDD30FF-E289-4844-AF3A-6932B43B01E6}" presName="textRect" presStyleLbl="revTx" presStyleIdx="2" presStyleCnt="4">
+        <dgm:presLayoutVars>
+          <dgm:chMax val="1"/>
+          <dgm:chPref val="1"/>
+        </dgm:presLayoutVars>
+      </dgm:prSet>
+      <dgm:spPr/>
+    </dgm:pt>
+    <dgm:pt modelId="{AF136BAF-8670-4BA4-981C-67C93521B679}" type="pres">
+      <dgm:prSet presAssocID="{1D2F246D-B0BA-4223-B166-2CA5F2E6B01D}" presName="sibTrans" presStyleCnt="0"/>
+      <dgm:spPr/>
+    </dgm:pt>
+    <dgm:pt modelId="{908DE8DD-04FC-4E52-AA7B-E1BF86966F4C}" type="pres">
+      <dgm:prSet presAssocID="{5C30A2A7-A465-4FC2-8835-C92138DB1BC6}" presName="compNode" presStyleCnt="0"/>
+      <dgm:spPr/>
+    </dgm:pt>
+    <dgm:pt modelId="{4462B91D-7831-4A55-A3FE-84909FD472C3}" type="pres">
+      <dgm:prSet presAssocID="{5C30A2A7-A465-4FC2-8835-C92138DB1BC6}" presName="iconBgRect" presStyleLbl="bgShp" presStyleIdx="3" presStyleCnt="4"/>
+      <dgm:spPr>
+        <a:prstGeom prst="round2DiagRect">
+          <a:avLst>
+            <a:gd name="adj1" fmla="val 29727"/>
+            <a:gd name="adj2" fmla="val 0"/>
+          </a:avLst>
+        </a:prstGeom>
+      </dgm:spPr>
+    </dgm:pt>
+    <dgm:pt modelId="{4A247091-709E-4423-B40C-E451B8FF38E3}" type="pres">
+      <dgm:prSet presAssocID="{5C30A2A7-A465-4FC2-8835-C92138DB1BC6}" presName="iconRect" presStyleLbl="node1" presStyleIdx="3" presStyleCnt="4"/>
+      <dgm:spPr>
+        <a:blipFill>
+          <a:blip xmlns:r="http://schemas.openxmlformats.org/officeDocument/2006/relationships" r:embed="rId7">
+            <a:extLst>
+              <a:ext uri="{28A0092B-C50C-407E-A947-70E740481C1C}">
+                <a14:useLocalDpi xmlns:a14="http://schemas.microsoft.com/office/drawing/2010/main" val="0"/>
+              </a:ext>
+              <a:ext uri="{96DAC541-7B7A-43D3-8B79-37D633B846F1}">
+                <asvg:svgBlip xmlns:asvg="http://schemas.microsoft.com/office/drawing/2016/SVG/main" r:embed="rId8"/>
+              </a:ext>
+            </a:extLst>
+          </a:blip>
+          <a:srcRect/>
+          <a:stretch>
+            <a:fillRect/>
+          </a:stretch>
+        </a:blipFill>
+      </dgm:spPr>
+      <dgm:extLst>
+        <a:ext uri="{E40237B7-FDA0-4F09-8148-C483321AD2D9}">
+          <dgm14:cNvPr xmlns:dgm14="http://schemas.microsoft.com/office/drawing/2010/diagram" id="0" name="" descr="Earth globe: Asia and Australia"/>
+        </a:ext>
+      </dgm:extLst>
+    </dgm:pt>
+    <dgm:pt modelId="{55B2EDF4-15A3-43BA-BFE9-6191B376E984}" type="pres">
+      <dgm:prSet presAssocID="{5C30A2A7-A465-4FC2-8835-C92138DB1BC6}" presName="spaceRect" presStyleCnt="0"/>
+      <dgm:spPr/>
+    </dgm:pt>
+    <dgm:pt modelId="{5DAE7358-4099-4F08-A9BA-48A35309ACF9}" type="pres">
+      <dgm:prSet presAssocID="{5C30A2A7-A465-4FC2-8835-C92138DB1BC6}" presName="textRect" presStyleLbl="revTx" presStyleIdx="3" presStyleCnt="4">
         <dgm:presLayoutVars>
           <dgm:chMax val="1"/>
           <dgm:chPref val="1"/>
@@ -3119,7 +3359,9 @@
     <dgm:cxn modelId="{A7188852-3FC9-4A22-B98D-C473B10A2286}" type="presOf" srcId="{13F8BAD6-C6DC-4207-B0E6-065B02D332A8}" destId="{1EC521C1-B7D6-442E-913B-4044031AEDD0}" srcOrd="0" destOrd="0" presId="urn:microsoft.com/office/officeart/2018/5/layout/IconLeafLabelList"/>
     <dgm:cxn modelId="{7B861154-3B69-4940-87CE-9152F3E01F1E}" type="presOf" srcId="{54A04A3B-5C3E-46BB-9552-96FFB9486C39}" destId="{4745E08A-A058-44CB-8CE1-D9EA3C0173BA}" srcOrd="0" destOrd="0" presId="urn:microsoft.com/office/officeart/2018/5/layout/IconLeafLabelList"/>
     <dgm:cxn modelId="{B8B46E75-AE12-467B-AD2B-4744F0163227}" srcId="{9A595FE4-30C8-42FD-A223-0FFB15AEEB9A}" destId="{4CDD30FF-E289-4844-AF3A-6932B43B01E6}" srcOrd="2" destOrd="0" parTransId="{8B6D802D-4427-46B6-80FA-C5A61771ECB4}" sibTransId="{1D2F246D-B0BA-4223-B166-2CA5F2E6B01D}"/>
+    <dgm:cxn modelId="{E4A7BC58-7BAA-4A7E-B48F-23CEAFA64DF6}" srcId="{9A595FE4-30C8-42FD-A223-0FFB15AEEB9A}" destId="{5C30A2A7-A465-4FC2-8835-C92138DB1BC6}" srcOrd="3" destOrd="0" parTransId="{AE9B696D-9936-44FC-B8EC-C80DD365CA7E}" sibTransId="{DAFF97CA-2D49-40A1-9F65-0616E9FD3660}"/>
     <dgm:cxn modelId="{1726A4A5-EFB1-4A9C-96C4-C08D1E9DF829}" type="presOf" srcId="{4CDD30FF-E289-4844-AF3A-6932B43B01E6}" destId="{5AD12752-8A9B-4BCC-BEE6-43EB0F39B5D8}" srcOrd="0" destOrd="0" presId="urn:microsoft.com/office/officeart/2018/5/layout/IconLeafLabelList"/>
+    <dgm:cxn modelId="{E56461D9-A583-4E33-A964-C89AFFAE70D2}" type="presOf" srcId="{5C30A2A7-A465-4FC2-8835-C92138DB1BC6}" destId="{5DAE7358-4099-4F08-A9BA-48A35309ACF9}" srcOrd="0" destOrd="0" presId="urn:microsoft.com/office/officeart/2018/5/layout/IconLeafLabelList"/>
     <dgm:cxn modelId="{8DE910E4-C7C8-4125-A229-826CDE4CCE24}" type="presParOf" srcId="{C566BAE4-D7BC-4D8D-B6A3-83E54B2D1D9B}" destId="{A3CE7099-1545-4648-85B8-E6DFAB11976C}" srcOrd="0" destOrd="0" presId="urn:microsoft.com/office/officeart/2018/5/layout/IconLeafLabelList"/>
     <dgm:cxn modelId="{A9F2B380-AF3A-4A07-AB09-36818DAB8AD6}" type="presParOf" srcId="{A3CE7099-1545-4648-85B8-E6DFAB11976C}" destId="{60BA88B1-DB94-46AB-B3A7-72B57AC30CC2}" srcOrd="0" destOrd="0" presId="urn:microsoft.com/office/officeart/2018/5/layout/IconLeafLabelList"/>
     <dgm:cxn modelId="{918C1B4C-6D1B-4D14-BB17-C5AA2B916C73}" type="presParOf" srcId="{A3CE7099-1545-4648-85B8-E6DFAB11976C}" destId="{FCEB0706-DE07-40BE-884F-703F86244086}" srcOrd="1" destOrd="0" presId="urn:microsoft.com/office/officeart/2018/5/layout/IconLeafLabelList"/>
@@ -3137,12 +3379,18 @@
     <dgm:cxn modelId="{C8483CB7-51BF-4578-B249-F938C5089731}" type="presParOf" srcId="{32D5467F-BAB3-47B4-A984-81667AC42644}" destId="{C4ABF4E7-C759-47BD-9DAF-2C0517969725}" srcOrd="1" destOrd="0" presId="urn:microsoft.com/office/officeart/2018/5/layout/IconLeafLabelList"/>
     <dgm:cxn modelId="{6BDF935A-C1A7-4809-9C0B-54F7A750540D}" type="presParOf" srcId="{32D5467F-BAB3-47B4-A984-81667AC42644}" destId="{B9F5CDBE-FECE-4707-9BC1-F2DD6A8B1EC0}" srcOrd="2" destOrd="0" presId="urn:microsoft.com/office/officeart/2018/5/layout/IconLeafLabelList"/>
     <dgm:cxn modelId="{9AA4B3A5-A647-49B0-AA3B-21076E960FDE}" type="presParOf" srcId="{32D5467F-BAB3-47B4-A984-81667AC42644}" destId="{5AD12752-8A9B-4BCC-BEE6-43EB0F39B5D8}" srcOrd="3" destOrd="0" presId="urn:microsoft.com/office/officeart/2018/5/layout/IconLeafLabelList"/>
+    <dgm:cxn modelId="{45B7821A-BB75-43BB-BEA3-F746F0F72D98}" type="presParOf" srcId="{C566BAE4-D7BC-4D8D-B6A3-83E54B2D1D9B}" destId="{AF136BAF-8670-4BA4-981C-67C93521B679}" srcOrd="5" destOrd="0" presId="urn:microsoft.com/office/officeart/2018/5/layout/IconLeafLabelList"/>
+    <dgm:cxn modelId="{AB89F909-428B-40F0-BC39-A8706EA57805}" type="presParOf" srcId="{C566BAE4-D7BC-4D8D-B6A3-83E54B2D1D9B}" destId="{908DE8DD-04FC-4E52-AA7B-E1BF86966F4C}" srcOrd="6" destOrd="0" presId="urn:microsoft.com/office/officeart/2018/5/layout/IconLeafLabelList"/>
+    <dgm:cxn modelId="{854084BE-366C-4F39-93DB-BFACFBB7DEF3}" type="presParOf" srcId="{908DE8DD-04FC-4E52-AA7B-E1BF86966F4C}" destId="{4462B91D-7831-4A55-A3FE-84909FD472C3}" srcOrd="0" destOrd="0" presId="urn:microsoft.com/office/officeart/2018/5/layout/IconLeafLabelList"/>
+    <dgm:cxn modelId="{2E2AEFDA-24D4-4248-95BA-6165F4D27850}" type="presParOf" srcId="{908DE8DD-04FC-4E52-AA7B-E1BF86966F4C}" destId="{4A247091-709E-4423-B40C-E451B8FF38E3}" srcOrd="1" destOrd="0" presId="urn:microsoft.com/office/officeart/2018/5/layout/IconLeafLabelList"/>
+    <dgm:cxn modelId="{8C7AAC5F-3EBD-4852-9627-FE17D4B8D897}" type="presParOf" srcId="{908DE8DD-04FC-4E52-AA7B-E1BF86966F4C}" destId="{55B2EDF4-15A3-43BA-BFE9-6191B376E984}" srcOrd="2" destOrd="0" presId="urn:microsoft.com/office/officeart/2018/5/layout/IconLeafLabelList"/>
+    <dgm:cxn modelId="{0EBE5F57-E342-4B90-84EF-D0033D975BB1}" type="presParOf" srcId="{908DE8DD-04FC-4E52-AA7B-E1BF86966F4C}" destId="{5DAE7358-4099-4F08-A9BA-48A35309ACF9}" srcOrd="3" destOrd="0" presId="urn:microsoft.com/office/officeart/2018/5/layout/IconLeafLabelList"/>
   </dgm:cxnLst>
   <dgm:bg/>
   <dgm:whole/>
   <dgm:extLst>
     <a:ext uri="http://schemas.microsoft.com/office/drawing/2008/diagram">
-      <dsp:dataModelExt xmlns:dsp="http://schemas.microsoft.com/office/drawing/2008/diagram" relId="rId8" minVer="http://schemas.openxmlformats.org/drawingml/2006/diagram"/>
+      <dsp:dataModelExt xmlns:dsp="http://schemas.microsoft.com/office/drawing/2008/diagram" relId="rId9" minVer="http://schemas.openxmlformats.org/drawingml/2006/diagram"/>
     </a:ext>
   </dgm:extLst>
 </dgm:dataModel>
@@ -3163,8 +3411,8 @@
       </dsp:nvSpPr>
       <dsp:spPr>
         <a:xfrm>
-          <a:off x="0" y="2033"/>
-          <a:ext cx="6266011" cy="1030627"/>
+          <a:off x="0" y="2324"/>
+          <a:ext cx="6266011" cy="1178112"/>
         </a:xfrm>
         <a:prstGeom prst="roundRect">
           <a:avLst>
@@ -3204,8 +3452,8 @@
       </dsp:nvSpPr>
       <dsp:spPr>
         <a:xfrm>
-          <a:off x="311764" y="233924"/>
-          <a:ext cx="566845" cy="566845"/>
+          <a:off x="356378" y="267399"/>
+          <a:ext cx="647961" cy="647961"/>
         </a:xfrm>
         <a:prstGeom prst="rect">
           <a:avLst/>
@@ -3253,8 +3501,8 @@
       </dsp:nvSpPr>
       <dsp:spPr>
         <a:xfrm>
-          <a:off x="1190374" y="2033"/>
-          <a:ext cx="5075636" cy="1030627"/>
+          <a:off x="1360719" y="2324"/>
+          <a:ext cx="4905291" cy="1178112"/>
         </a:xfrm>
         <a:prstGeom prst="rect">
           <a:avLst/>
@@ -3278,7 +3526,7 @@
         <a:fontRef idx="minor"/>
       </dsp:style>
       <dsp:txBody>
-        <a:bodyPr spcFirstLastPara="0" vert="horz" wrap="square" lIns="109075" tIns="109075" rIns="109075" bIns="109075" numCol="1" spcCol="1270" anchor="ctr" anchorCtr="0">
+        <a:bodyPr spcFirstLastPara="0" vert="horz" wrap="square" lIns="124684" tIns="124684" rIns="124684" bIns="124684" numCol="1" spcCol="1270" anchor="ctr" anchorCtr="0">
           <a:noAutofit/>
         </a:bodyPr>
         <a:lstStyle/>
@@ -3302,8 +3550,8 @@
         </a:p>
       </dsp:txBody>
       <dsp:txXfrm>
-        <a:off x="1190374" y="2033"/>
-        <a:ext cx="5075636" cy="1030627"/>
+        <a:off x="1360719" y="2324"/>
+        <a:ext cx="4905291" cy="1178112"/>
       </dsp:txXfrm>
     </dsp:sp>
     <dsp:sp modelId="{A6F5A988-3FCC-443F-A551-EA8603D5F9C5}">
@@ -3313,8 +3561,8 @@
       </dsp:nvSpPr>
       <dsp:spPr>
         <a:xfrm>
-          <a:off x="0" y="1290317"/>
-          <a:ext cx="6266011" cy="1030627"/>
+          <a:off x="0" y="1474964"/>
+          <a:ext cx="6266011" cy="1178112"/>
         </a:xfrm>
         <a:prstGeom prst="roundRect">
           <a:avLst>
@@ -3354,8 +3602,8 @@
       </dsp:nvSpPr>
       <dsp:spPr>
         <a:xfrm>
-          <a:off x="311764" y="1522208"/>
-          <a:ext cx="566845" cy="566845"/>
+          <a:off x="356378" y="1740040"/>
+          <a:ext cx="647961" cy="647961"/>
         </a:xfrm>
         <a:prstGeom prst="rect">
           <a:avLst/>
@@ -3403,8 +3651,8 @@
       </dsp:nvSpPr>
       <dsp:spPr>
         <a:xfrm>
-          <a:off x="1190374" y="1290317"/>
-          <a:ext cx="5075636" cy="1030627"/>
+          <a:off x="1360719" y="1474964"/>
+          <a:ext cx="4905291" cy="1178112"/>
         </a:xfrm>
         <a:prstGeom prst="rect">
           <a:avLst/>
@@ -3428,7 +3676,7 @@
         <a:fontRef idx="minor"/>
       </dsp:style>
       <dsp:txBody>
-        <a:bodyPr spcFirstLastPara="0" vert="horz" wrap="square" lIns="109075" tIns="109075" rIns="109075" bIns="109075" numCol="1" spcCol="1270" anchor="ctr" anchorCtr="0">
+        <a:bodyPr spcFirstLastPara="0" vert="horz" wrap="square" lIns="124684" tIns="124684" rIns="124684" bIns="124684" numCol="1" spcCol="1270" anchor="ctr" anchorCtr="0">
           <a:noAutofit/>
         </a:bodyPr>
         <a:lstStyle/>
@@ -3446,14 +3694,14 @@
             <a:buNone/>
           </a:pPr>
           <a:r>
-            <a:rPr lang="en-US" sz="1700" kern="1200"/>
-            <a:t>You can go the same old, same old but you’re probably tired of that since that’s all you’ve been drinking for the past 6 months</a:t>
+            <a:rPr lang="en-US" sz="1700" kern="1200" dirty="0"/>
+            <a:t>You can go with the same old, same old but you’re probably tired of that since that’s all you’ve been drinking for the past 6 months</a:t>
           </a:r>
         </a:p>
       </dsp:txBody>
       <dsp:txXfrm>
-        <a:off x="1190374" y="1290317"/>
-        <a:ext cx="5075636" cy="1030627"/>
+        <a:off x="1360719" y="1474964"/>
+        <a:ext cx="4905291" cy="1178112"/>
       </dsp:txXfrm>
     </dsp:sp>
     <dsp:sp modelId="{43D4E4B8-2752-4084-ADC1-716F9167BD55}">
@@ -3463,8 +3711,8 @@
       </dsp:nvSpPr>
       <dsp:spPr>
         <a:xfrm>
-          <a:off x="0" y="2578601"/>
-          <a:ext cx="6266011" cy="1030627"/>
+          <a:off x="0" y="2947605"/>
+          <a:ext cx="6266011" cy="1178112"/>
         </a:xfrm>
         <a:prstGeom prst="roundRect">
           <a:avLst>
@@ -3504,8 +3752,8 @@
       </dsp:nvSpPr>
       <dsp:spPr>
         <a:xfrm>
-          <a:off x="311764" y="2810493"/>
-          <a:ext cx="566845" cy="566845"/>
+          <a:off x="356378" y="3212680"/>
+          <a:ext cx="647961" cy="647961"/>
         </a:xfrm>
         <a:prstGeom prst="rect">
           <a:avLst/>
@@ -3553,8 +3801,8 @@
       </dsp:nvSpPr>
       <dsp:spPr>
         <a:xfrm>
-          <a:off x="1190374" y="2578601"/>
-          <a:ext cx="5075636" cy="1030627"/>
+          <a:off x="1360719" y="2947605"/>
+          <a:ext cx="4905291" cy="1178112"/>
         </a:xfrm>
         <a:prstGeom prst="rect">
           <a:avLst/>
@@ -3578,7 +3826,7 @@
         <a:fontRef idx="minor"/>
       </dsp:style>
       <dsp:txBody>
-        <a:bodyPr spcFirstLastPara="0" vert="horz" wrap="square" lIns="109075" tIns="109075" rIns="109075" bIns="109075" numCol="1" spcCol="1270" anchor="ctr" anchorCtr="0">
+        <a:bodyPr spcFirstLastPara="0" vert="horz" wrap="square" lIns="124684" tIns="124684" rIns="124684" bIns="124684" numCol="1" spcCol="1270" anchor="ctr" anchorCtr="0">
           <a:noAutofit/>
         </a:bodyPr>
         <a:lstStyle/>
@@ -3596,14 +3844,14 @@
             <a:buNone/>
           </a:pPr>
           <a:r>
-            <a:rPr lang="en-US" sz="1700" kern="1200"/>
-            <a:t>We thought it would be great to celebrate the world of craft beers and get Victorians to try something different and find a new favorite</a:t>
+            <a:rPr lang="en-US" sz="1700" kern="1200" dirty="0"/>
+            <a:t>We thought it would be great to celebrate the world of craft beers and get beer lovers to try something different and find a new favorite</a:t>
           </a:r>
         </a:p>
       </dsp:txBody>
       <dsp:txXfrm>
-        <a:off x="1190374" y="2578601"/>
-        <a:ext cx="5075636" cy="1030627"/>
+        <a:off x="1360719" y="2947605"/>
+        <a:ext cx="4905291" cy="1178112"/>
       </dsp:txXfrm>
     </dsp:sp>
     <dsp:sp modelId="{44CFD235-ABAB-48D0-820D-D52A1C84BB77}">
@@ -3613,8 +3861,8 @@
       </dsp:nvSpPr>
       <dsp:spPr>
         <a:xfrm>
-          <a:off x="0" y="3866886"/>
-          <a:ext cx="6266011" cy="1030627"/>
+          <a:off x="0" y="4420245"/>
+          <a:ext cx="6266011" cy="1178112"/>
         </a:xfrm>
         <a:prstGeom prst="roundRect">
           <a:avLst>
@@ -3654,8 +3902,8 @@
       </dsp:nvSpPr>
       <dsp:spPr>
         <a:xfrm>
-          <a:off x="311764" y="4098777"/>
-          <a:ext cx="566845" cy="566845"/>
+          <a:off x="356378" y="4685320"/>
+          <a:ext cx="647961" cy="647961"/>
         </a:xfrm>
         <a:prstGeom prst="rect">
           <a:avLst/>
@@ -3703,8 +3951,8 @@
       </dsp:nvSpPr>
       <dsp:spPr>
         <a:xfrm>
-          <a:off x="1190374" y="3866886"/>
-          <a:ext cx="5075636" cy="1030627"/>
+          <a:off x="1360719" y="4420245"/>
+          <a:ext cx="4905291" cy="1178112"/>
         </a:xfrm>
         <a:prstGeom prst="rect">
           <a:avLst/>
@@ -3728,7 +3976,7 @@
         <a:fontRef idx="minor"/>
       </dsp:style>
       <dsp:txBody>
-        <a:bodyPr spcFirstLastPara="0" vert="horz" wrap="square" lIns="109075" tIns="109075" rIns="109075" bIns="109075" numCol="1" spcCol="1270" anchor="ctr" anchorCtr="0">
+        <a:bodyPr spcFirstLastPara="0" vert="horz" wrap="square" lIns="124684" tIns="124684" rIns="124684" bIns="124684" numCol="1" spcCol="1270" anchor="ctr" anchorCtr="0">
           <a:noAutofit/>
         </a:bodyPr>
         <a:lstStyle/>
@@ -3746,14 +3994,14 @@
             <a:buNone/>
           </a:pPr>
           <a:r>
-            <a:rPr lang="en-US" sz="1700" kern="1200"/>
-            <a:t>Using review data and data on breweries, we set out on a virtual brewery crawl to find good datasets to teach a computer how to appreciate a good craft beer</a:t>
+            <a:rPr lang="en-US" sz="1700" kern="1200" dirty="0"/>
+            <a:t>Using review data and data on breweries, we set out on a virtual brewery crawl to find good datasets and ways to teach a model how to appreciate a good craft beer, and recommend one</a:t>
           </a:r>
         </a:p>
       </dsp:txBody>
       <dsp:txXfrm>
-        <a:off x="1190374" y="3866886"/>
-        <a:ext cx="5075636" cy="1030627"/>
+        <a:off x="1360719" y="4420245"/>
+        <a:ext cx="4905291" cy="1178112"/>
       </dsp:txXfrm>
     </dsp:sp>
   </dsp:spTree>
@@ -3775,8 +4023,8 @@
       </dsp:nvSpPr>
       <dsp:spPr>
         <a:xfrm>
-          <a:off x="681337" y="374184"/>
-          <a:ext cx="1852875" cy="1852875"/>
+          <a:off x="902689" y="762263"/>
+          <a:ext cx="1261054" cy="1261054"/>
         </a:xfrm>
         <a:prstGeom prst="round2DiagRect">
           <a:avLst>
@@ -3817,8 +4065,8 @@
       </dsp:nvSpPr>
       <dsp:spPr>
         <a:xfrm>
-          <a:off x="1076212" y="769059"/>
-          <a:ext cx="1063125" cy="1063125"/>
+          <a:off x="1171439" y="1031012"/>
+          <a:ext cx="723555" cy="723555"/>
         </a:xfrm>
         <a:prstGeom prst="rect">
           <a:avLst/>
@@ -3866,8 +4114,8 @@
       </dsp:nvSpPr>
       <dsp:spPr>
         <a:xfrm>
-          <a:off x="89024" y="2804184"/>
-          <a:ext cx="3037500" cy="720000"/>
+          <a:off x="499565" y="2416105"/>
+          <a:ext cx="2067302" cy="720000"/>
         </a:xfrm>
         <a:prstGeom prst="rect">
           <a:avLst/>
@@ -3896,9 +4144,9 @@
         </a:bodyPr>
         <a:lstStyle/>
         <a:p>
-          <a:pPr marL="0" lvl="0" indent="0" algn="ctr" defTabSz="800100">
+          <a:pPr marL="0" lvl="0" indent="0" algn="ctr" defTabSz="488950">
             <a:lnSpc>
-              <a:spcPct val="90000"/>
+              <a:spcPct val="100000"/>
             </a:lnSpc>
             <a:spcBef>
               <a:spcPct val="0"/>
@@ -3910,14 +4158,14 @@
             <a:defRPr cap="all"/>
           </a:pPr>
           <a:r>
-            <a:rPr lang="en-US" sz="1800" kern="1200"/>
-            <a:t>From our search, we identified 2 data sets</a:t>
+            <a:rPr lang="en-US" sz="1100" kern="1200" dirty="0"/>
+            <a:t>From our search, we identified 3 data points which provided us with the information needed</a:t>
           </a:r>
         </a:p>
       </dsp:txBody>
       <dsp:txXfrm>
-        <a:off x="89024" y="2804184"/>
-        <a:ext cx="3037500" cy="720000"/>
+        <a:off x="499565" y="2416105"/>
+        <a:ext cx="2067302" cy="720000"/>
       </dsp:txXfrm>
     </dsp:sp>
     <dsp:sp modelId="{C049969C-CBB0-4814-A422-94756F300E87}">
@@ -3927,8 +4175,8 @@
       </dsp:nvSpPr>
       <dsp:spPr>
         <a:xfrm>
-          <a:off x="4250400" y="374184"/>
-          <a:ext cx="1852875" cy="1852875"/>
+          <a:off x="3331770" y="762263"/>
+          <a:ext cx="1261054" cy="1261054"/>
         </a:xfrm>
         <a:prstGeom prst="round2DiagRect">
           <a:avLst>
@@ -3969,8 +4217,8 @@
       </dsp:nvSpPr>
       <dsp:spPr>
         <a:xfrm>
-          <a:off x="4645275" y="769059"/>
-          <a:ext cx="1063125" cy="1063125"/>
+          <a:off x="3600519" y="1031012"/>
+          <a:ext cx="723555" cy="723555"/>
         </a:xfrm>
         <a:prstGeom prst="rect">
           <a:avLst/>
@@ -4018,8 +4266,8 @@
       </dsp:nvSpPr>
       <dsp:spPr>
         <a:xfrm>
-          <a:off x="3658087" y="2804184"/>
-          <a:ext cx="3037500" cy="720000"/>
+          <a:off x="2928646" y="2416105"/>
+          <a:ext cx="2067302" cy="720000"/>
         </a:xfrm>
         <a:prstGeom prst="rect">
           <a:avLst/>
@@ -4048,9 +4296,9 @@
         </a:bodyPr>
         <a:lstStyle/>
         <a:p>
-          <a:pPr marL="0" lvl="0" indent="0" algn="ctr" defTabSz="800100">
+          <a:pPr marL="0" lvl="0" indent="0" algn="ctr" defTabSz="488950">
             <a:lnSpc>
-              <a:spcPct val="90000"/>
+              <a:spcPct val="100000"/>
             </a:lnSpc>
             <a:spcBef>
               <a:spcPct val="0"/>
@@ -4062,14 +4310,19 @@
             <a:defRPr cap="all"/>
           </a:pPr>
           <a:r>
-            <a:rPr lang="en-US" sz="1800" kern="1200"/>
-            <a:t>Data set 1 – []</a:t>
+            <a:rPr lang="en-US" sz="1100" kern="1200" dirty="0"/>
+            <a:t>Data point 1 – </a:t>
           </a:r>
+          <a:r>
+            <a:rPr lang="en-US" sz="1100" kern="1200" dirty="0" err="1"/>
+            <a:t>Dataworld</a:t>
+          </a:r>
+          <a:endParaRPr lang="en-US" sz="1100" kern="1200" dirty="0"/>
         </a:p>
       </dsp:txBody>
       <dsp:txXfrm>
-        <a:off x="3658087" y="2804184"/>
-        <a:ext cx="3037500" cy="720000"/>
+        <a:off x="2928646" y="2416105"/>
+        <a:ext cx="2067302" cy="720000"/>
       </dsp:txXfrm>
     </dsp:sp>
     <dsp:sp modelId="{582167B2-8168-46D5-9650-BE2BD03B679C}">
@@ -4079,8 +4332,8 @@
       </dsp:nvSpPr>
       <dsp:spPr>
         <a:xfrm>
-          <a:off x="7819462" y="374184"/>
-          <a:ext cx="1852875" cy="1852875"/>
+          <a:off x="5760850" y="762263"/>
+          <a:ext cx="1261054" cy="1261054"/>
         </a:xfrm>
         <a:prstGeom prst="round2DiagRect">
           <a:avLst>
@@ -4121,8 +4374,8 @@
       </dsp:nvSpPr>
       <dsp:spPr>
         <a:xfrm>
-          <a:off x="8214337" y="769059"/>
-          <a:ext cx="1063125" cy="1063125"/>
+          <a:off x="6029599" y="1031012"/>
+          <a:ext cx="723555" cy="723555"/>
         </a:xfrm>
         <a:prstGeom prst="rect">
           <a:avLst/>
@@ -4170,8 +4423,8 @@
       </dsp:nvSpPr>
       <dsp:spPr>
         <a:xfrm>
-          <a:off x="7227150" y="2804184"/>
-          <a:ext cx="3037500" cy="720000"/>
+          <a:off x="5357726" y="2416105"/>
+          <a:ext cx="2067302" cy="720000"/>
         </a:xfrm>
         <a:prstGeom prst="rect">
           <a:avLst/>
@@ -4200,9 +4453,9 @@
         </a:bodyPr>
         <a:lstStyle/>
         <a:p>
-          <a:pPr marL="0" lvl="0" indent="0" algn="ctr" defTabSz="800100">
+          <a:pPr marL="0" lvl="0" indent="0" algn="ctr" defTabSz="488950">
             <a:lnSpc>
-              <a:spcPct val="90000"/>
+              <a:spcPct val="100000"/>
             </a:lnSpc>
             <a:spcBef>
               <a:spcPct val="0"/>
@@ -4214,14 +4467,175 @@
             <a:defRPr cap="all"/>
           </a:pPr>
           <a:r>
-            <a:rPr lang="en-US" sz="1800" kern="1200"/>
-            <a:t>Data set 2 – []</a:t>
+            <a:rPr lang="en-US" sz="1100" kern="1200" dirty="0"/>
+            <a:t>Data point 2 – BeerAdvocate Website</a:t>
           </a:r>
         </a:p>
       </dsp:txBody>
       <dsp:txXfrm>
-        <a:off x="7227150" y="2804184"/>
-        <a:ext cx="3037500" cy="720000"/>
+        <a:off x="5357726" y="2416105"/>
+        <a:ext cx="2067302" cy="720000"/>
+      </dsp:txXfrm>
+    </dsp:sp>
+    <dsp:sp modelId="{4462B91D-7831-4A55-A3FE-84909FD472C3}">
+      <dsp:nvSpPr>
+        <dsp:cNvPr id="0" name=""/>
+        <dsp:cNvSpPr/>
+      </dsp:nvSpPr>
+      <dsp:spPr>
+        <a:xfrm>
+          <a:off x="8189930" y="762263"/>
+          <a:ext cx="1261054" cy="1261054"/>
+        </a:xfrm>
+        <a:prstGeom prst="round2DiagRect">
+          <a:avLst>
+            <a:gd name="adj1" fmla="val 29727"/>
+            <a:gd name="adj2" fmla="val 0"/>
+          </a:avLst>
+        </a:prstGeom>
+        <a:solidFill>
+          <a:schemeClr val="accent5">
+            <a:hueOff val="0"/>
+            <a:satOff val="0"/>
+            <a:lumOff val="0"/>
+            <a:alphaOff val="0"/>
+          </a:schemeClr>
+        </a:solidFill>
+        <a:ln>
+          <a:noFill/>
+        </a:ln>
+        <a:effectLst/>
+      </dsp:spPr>
+      <dsp:style>
+        <a:lnRef idx="0">
+          <a:scrgbClr r="0" g="0" b="0"/>
+        </a:lnRef>
+        <a:fillRef idx="1">
+          <a:scrgbClr r="0" g="0" b="0"/>
+        </a:fillRef>
+        <a:effectRef idx="0">
+          <a:scrgbClr r="0" g="0" b="0"/>
+        </a:effectRef>
+        <a:fontRef idx="minor"/>
+      </dsp:style>
+    </dsp:sp>
+    <dsp:sp modelId="{4A247091-709E-4423-B40C-E451B8FF38E3}">
+      <dsp:nvSpPr>
+        <dsp:cNvPr id="0" name=""/>
+        <dsp:cNvSpPr/>
+      </dsp:nvSpPr>
+      <dsp:spPr>
+        <a:xfrm>
+          <a:off x="8458679" y="1031012"/>
+          <a:ext cx="723555" cy="723555"/>
+        </a:xfrm>
+        <a:prstGeom prst="rect">
+          <a:avLst/>
+        </a:prstGeom>
+        <a:blipFill>
+          <a:blip xmlns:r="http://schemas.openxmlformats.org/officeDocument/2006/relationships" r:embed="rId7">
+            <a:extLst>
+              <a:ext uri="{28A0092B-C50C-407E-A947-70E740481C1C}">
+                <a14:useLocalDpi xmlns:a14="http://schemas.microsoft.com/office/drawing/2010/main" val="0"/>
+              </a:ext>
+              <a:ext uri="{96DAC541-7B7A-43D3-8B79-37D633B846F1}">
+                <asvg:svgBlip xmlns:asvg="http://schemas.microsoft.com/office/drawing/2016/SVG/main" r:embed="rId8"/>
+              </a:ext>
+            </a:extLst>
+          </a:blip>
+          <a:srcRect/>
+          <a:stretch>
+            <a:fillRect/>
+          </a:stretch>
+        </a:blipFill>
+        <a:ln w="15875" cap="rnd" cmpd="sng" algn="ctr">
+          <a:solidFill>
+            <a:schemeClr val="lt1">
+              <a:alpha val="0"/>
+              <a:hueOff val="0"/>
+              <a:satOff val="0"/>
+              <a:lumOff val="0"/>
+              <a:alphaOff val="0"/>
+            </a:schemeClr>
+          </a:solidFill>
+          <a:prstDash val="solid"/>
+        </a:ln>
+        <a:effectLst/>
+      </dsp:spPr>
+      <dsp:style>
+        <a:lnRef idx="2">
+          <a:scrgbClr r="0" g="0" b="0"/>
+        </a:lnRef>
+        <a:fillRef idx="1">
+          <a:scrgbClr r="0" g="0" b="0"/>
+        </a:fillRef>
+        <a:effectRef idx="0">
+          <a:scrgbClr r="0" g="0" b="0"/>
+        </a:effectRef>
+        <a:fontRef idx="minor">
+          <a:schemeClr val="lt1"/>
+        </a:fontRef>
+      </dsp:style>
+    </dsp:sp>
+    <dsp:sp modelId="{5DAE7358-4099-4F08-A9BA-48A35309ACF9}">
+      <dsp:nvSpPr>
+        <dsp:cNvPr id="0" name=""/>
+        <dsp:cNvSpPr/>
+      </dsp:nvSpPr>
+      <dsp:spPr>
+        <a:xfrm>
+          <a:off x="7786806" y="2416105"/>
+          <a:ext cx="2067302" cy="720000"/>
+        </a:xfrm>
+        <a:prstGeom prst="rect">
+          <a:avLst/>
+        </a:prstGeom>
+        <a:noFill/>
+        <a:ln>
+          <a:noFill/>
+        </a:ln>
+        <a:effectLst/>
+      </dsp:spPr>
+      <dsp:style>
+        <a:lnRef idx="0">
+          <a:scrgbClr r="0" g="0" b="0"/>
+        </a:lnRef>
+        <a:fillRef idx="0">
+          <a:scrgbClr r="0" g="0" b="0"/>
+        </a:fillRef>
+        <a:effectRef idx="0">
+          <a:scrgbClr r="0" g="0" b="0"/>
+        </a:effectRef>
+        <a:fontRef idx="minor"/>
+      </dsp:style>
+      <dsp:txBody>
+        <a:bodyPr spcFirstLastPara="0" vert="horz" wrap="square" lIns="0" tIns="0" rIns="0" bIns="0" numCol="1" spcCol="1270" anchor="t" anchorCtr="0">
+          <a:noAutofit/>
+        </a:bodyPr>
+        <a:lstStyle/>
+        <a:p>
+          <a:pPr marL="0" lvl="0" indent="0" algn="ctr" defTabSz="488950">
+            <a:lnSpc>
+              <a:spcPct val="100000"/>
+            </a:lnSpc>
+            <a:spcBef>
+              <a:spcPct val="0"/>
+            </a:spcBef>
+            <a:spcAft>
+              <a:spcPct val="35000"/>
+            </a:spcAft>
+            <a:buNone/>
+            <a:defRPr cap="all"/>
+          </a:pPr>
+          <a:r>
+            <a:rPr lang="en-US" sz="1100" kern="1200" dirty="0"/>
+            <a:t>Data point 3 – Google API</a:t>
+          </a:r>
+        </a:p>
+      </dsp:txBody>
+      <dsp:txXfrm>
+        <a:off x="7786806" y="2416105"/>
+        <a:ext cx="2067302" cy="720000"/>
       </dsp:txXfrm>
     </dsp:sp>
   </dsp:spTree>
@@ -6817,6 +7231,1591 @@
 </dgm:styleDef>
 </file>
 
+<file path=ppt/notesMasters/notesMaster1.xml><?xml version="1.0" encoding="utf-8"?>
+<p:notesMaster xmlns:a="http://schemas.openxmlformats.org/drawingml/2006/main" xmlns:r="http://schemas.openxmlformats.org/officeDocument/2006/relationships" xmlns:p="http://schemas.openxmlformats.org/presentationml/2006/main">
+  <p:cSld>
+    <p:bg>
+      <p:bgRef idx="1001">
+        <a:schemeClr val="bg1"/>
+      </p:bgRef>
+    </p:bg>
+    <p:spTree>
+      <p:nvGrpSpPr>
+        <p:cNvPr id="1" name=""/>
+        <p:cNvGrpSpPr/>
+        <p:nvPr/>
+      </p:nvGrpSpPr>
+      <p:grpSpPr>
+        <a:xfrm>
+          <a:off x="0" y="0"/>
+          <a:ext cx="0" cy="0"/>
+          <a:chOff x="0" y="0"/>
+          <a:chExt cx="0" cy="0"/>
+        </a:xfrm>
+      </p:grpSpPr>
+      <p:sp>
+        <p:nvSpPr>
+          <p:cNvPr id="2" name="Header Placeholder 1"/>
+          <p:cNvSpPr>
+            <a:spLocks noGrp="1"/>
+          </p:cNvSpPr>
+          <p:nvPr>
+            <p:ph type="hdr" sz="quarter"/>
+          </p:nvPr>
+        </p:nvSpPr>
+        <p:spPr>
+          <a:xfrm>
+            <a:off x="0" y="0"/>
+            <a:ext cx="2971800" cy="458788"/>
+          </a:xfrm>
+          <a:prstGeom prst="rect">
+            <a:avLst/>
+          </a:prstGeom>
+        </p:spPr>
+        <p:txBody>
+          <a:bodyPr vert="horz" lIns="91440" tIns="45720" rIns="91440" bIns="45720" rtlCol="0"/>
+          <a:lstStyle>
+            <a:lvl1pPr algn="l">
+              <a:defRPr sz="1200"/>
+            </a:lvl1pPr>
+          </a:lstStyle>
+          <a:p>
+            <a:endParaRPr lang="en-AU"/>
+          </a:p>
+        </p:txBody>
+      </p:sp>
+      <p:sp>
+        <p:nvSpPr>
+          <p:cNvPr id="3" name="Date Placeholder 2"/>
+          <p:cNvSpPr>
+            <a:spLocks noGrp="1"/>
+          </p:cNvSpPr>
+          <p:nvPr>
+            <p:ph type="dt" idx="1"/>
+          </p:nvPr>
+        </p:nvSpPr>
+        <p:spPr>
+          <a:xfrm>
+            <a:off x="3884613" y="0"/>
+            <a:ext cx="2971800" cy="458788"/>
+          </a:xfrm>
+          <a:prstGeom prst="rect">
+            <a:avLst/>
+          </a:prstGeom>
+        </p:spPr>
+        <p:txBody>
+          <a:bodyPr vert="horz" lIns="91440" tIns="45720" rIns="91440" bIns="45720" rtlCol="0"/>
+          <a:lstStyle>
+            <a:lvl1pPr algn="r">
+              <a:defRPr sz="1200"/>
+            </a:lvl1pPr>
+          </a:lstStyle>
+          <a:p>
+            <a:fld id="{0ABA73E0-A92A-4457-8865-D82CCE903A86}" type="datetimeFigureOut">
+              <a:rPr lang="en-AU" smtClean="0"/>
+              <a:t>24/10/2020</a:t>
+            </a:fld>
+            <a:endParaRPr lang="en-AU"/>
+          </a:p>
+        </p:txBody>
+      </p:sp>
+      <p:sp>
+        <p:nvSpPr>
+          <p:cNvPr id="4" name="Slide Image Placeholder 3"/>
+          <p:cNvSpPr>
+            <a:spLocks noGrp="1" noRot="1" noChangeAspect="1"/>
+          </p:cNvSpPr>
+          <p:nvPr>
+            <p:ph type="sldImg" idx="2"/>
+          </p:nvPr>
+        </p:nvSpPr>
+        <p:spPr>
+          <a:xfrm>
+            <a:off x="685800" y="1143000"/>
+            <a:ext cx="5486400" cy="3086100"/>
+          </a:xfrm>
+          <a:prstGeom prst="rect">
+            <a:avLst/>
+          </a:prstGeom>
+          <a:noFill/>
+          <a:ln w="12700">
+            <a:solidFill>
+              <a:prstClr val="black"/>
+            </a:solidFill>
+          </a:ln>
+        </p:spPr>
+        <p:txBody>
+          <a:bodyPr vert="horz" lIns="91440" tIns="45720" rIns="91440" bIns="45720" rtlCol="0" anchor="ctr"/>
+          <a:lstStyle/>
+          <a:p>
+            <a:endParaRPr lang="en-AU"/>
+          </a:p>
+        </p:txBody>
+      </p:sp>
+      <p:sp>
+        <p:nvSpPr>
+          <p:cNvPr id="5" name="Notes Placeholder 4"/>
+          <p:cNvSpPr>
+            <a:spLocks noGrp="1"/>
+          </p:cNvSpPr>
+          <p:nvPr>
+            <p:ph type="body" sz="quarter" idx="3"/>
+          </p:nvPr>
+        </p:nvSpPr>
+        <p:spPr>
+          <a:xfrm>
+            <a:off x="685800" y="4400550"/>
+            <a:ext cx="5486400" cy="3600450"/>
+          </a:xfrm>
+          <a:prstGeom prst="rect">
+            <a:avLst/>
+          </a:prstGeom>
+        </p:spPr>
+        <p:txBody>
+          <a:bodyPr vert="horz" lIns="91440" tIns="45720" rIns="91440" bIns="45720" rtlCol="0"/>
+          <a:lstStyle/>
+          <a:p>
+            <a:pPr lvl="0"/>
+            <a:r>
+              <a:rPr lang="en-US"/>
+              <a:t>Click to edit Master text styles</a:t>
+            </a:r>
+          </a:p>
+          <a:p>
+            <a:pPr lvl="1"/>
+            <a:r>
+              <a:rPr lang="en-US"/>
+              <a:t>Second level</a:t>
+            </a:r>
+          </a:p>
+          <a:p>
+            <a:pPr lvl="2"/>
+            <a:r>
+              <a:rPr lang="en-US"/>
+              <a:t>Third level</a:t>
+            </a:r>
+          </a:p>
+          <a:p>
+            <a:pPr lvl="3"/>
+            <a:r>
+              <a:rPr lang="en-US"/>
+              <a:t>Fourth level</a:t>
+            </a:r>
+          </a:p>
+          <a:p>
+            <a:pPr lvl="4"/>
+            <a:r>
+              <a:rPr lang="en-US"/>
+              <a:t>Fifth level</a:t>
+            </a:r>
+            <a:endParaRPr lang="en-AU"/>
+          </a:p>
+        </p:txBody>
+      </p:sp>
+      <p:sp>
+        <p:nvSpPr>
+          <p:cNvPr id="6" name="Footer Placeholder 5"/>
+          <p:cNvSpPr>
+            <a:spLocks noGrp="1"/>
+          </p:cNvSpPr>
+          <p:nvPr>
+            <p:ph type="ftr" sz="quarter" idx="4"/>
+          </p:nvPr>
+        </p:nvSpPr>
+        <p:spPr>
+          <a:xfrm>
+            <a:off x="0" y="8685213"/>
+            <a:ext cx="2971800" cy="458787"/>
+          </a:xfrm>
+          <a:prstGeom prst="rect">
+            <a:avLst/>
+          </a:prstGeom>
+        </p:spPr>
+        <p:txBody>
+          <a:bodyPr vert="horz" lIns="91440" tIns="45720" rIns="91440" bIns="45720" rtlCol="0" anchor="b"/>
+          <a:lstStyle>
+            <a:lvl1pPr algn="l">
+              <a:defRPr sz="1200"/>
+            </a:lvl1pPr>
+          </a:lstStyle>
+          <a:p>
+            <a:endParaRPr lang="en-AU"/>
+          </a:p>
+        </p:txBody>
+      </p:sp>
+      <p:sp>
+        <p:nvSpPr>
+          <p:cNvPr id="7" name="Slide Number Placeholder 6"/>
+          <p:cNvSpPr>
+            <a:spLocks noGrp="1"/>
+          </p:cNvSpPr>
+          <p:nvPr>
+            <p:ph type="sldNum" sz="quarter" idx="5"/>
+          </p:nvPr>
+        </p:nvSpPr>
+        <p:spPr>
+          <a:xfrm>
+            <a:off x="3884613" y="8685213"/>
+            <a:ext cx="2971800" cy="458787"/>
+          </a:xfrm>
+          <a:prstGeom prst="rect">
+            <a:avLst/>
+          </a:prstGeom>
+        </p:spPr>
+        <p:txBody>
+          <a:bodyPr vert="horz" lIns="91440" tIns="45720" rIns="91440" bIns="45720" rtlCol="0" anchor="b"/>
+          <a:lstStyle>
+            <a:lvl1pPr algn="r">
+              <a:defRPr sz="1200"/>
+            </a:lvl1pPr>
+          </a:lstStyle>
+          <a:p>
+            <a:fld id="{068BBB84-BA30-4708-A5F1-8EA79474F327}" type="slidenum">
+              <a:rPr lang="en-AU" smtClean="0"/>
+              <a:t>‹#›</a:t>
+            </a:fld>
+            <a:endParaRPr lang="en-AU"/>
+          </a:p>
+        </p:txBody>
+      </p:sp>
+    </p:spTree>
+    <p:extLst>
+      <p:ext uri="{BB962C8B-B14F-4D97-AF65-F5344CB8AC3E}">
+        <p14:creationId xmlns:p14="http://schemas.microsoft.com/office/powerpoint/2010/main" val="2041788076"/>
+      </p:ext>
+    </p:extLst>
+  </p:cSld>
+  <p:clrMap bg1="lt1" tx1="dk1" bg2="lt2" tx2="dk2" accent1="accent1" accent2="accent2" accent3="accent3" accent4="accent4" accent5="accent5" accent6="accent6" hlink="hlink" folHlink="folHlink"/>
+  <p:notesStyle>
+    <a:lvl1pPr marL="0" algn="l" defTabSz="914400" rtl="0" eaLnBrk="1" latinLnBrk="0" hangingPunct="1">
+      <a:defRPr sz="1200" kern="1200">
+        <a:solidFill>
+          <a:schemeClr val="tx1"/>
+        </a:solidFill>
+        <a:latin typeface="+mn-lt"/>
+        <a:ea typeface="+mn-ea"/>
+        <a:cs typeface="+mn-cs"/>
+      </a:defRPr>
+    </a:lvl1pPr>
+    <a:lvl2pPr marL="457200" algn="l" defTabSz="914400" rtl="0" eaLnBrk="1" latinLnBrk="0" hangingPunct="1">
+      <a:defRPr sz="1200" kern="1200">
+        <a:solidFill>
+          <a:schemeClr val="tx1"/>
+        </a:solidFill>
+        <a:latin typeface="+mn-lt"/>
+        <a:ea typeface="+mn-ea"/>
+        <a:cs typeface="+mn-cs"/>
+      </a:defRPr>
+    </a:lvl2pPr>
+    <a:lvl3pPr marL="914400" algn="l" defTabSz="914400" rtl="0" eaLnBrk="1" latinLnBrk="0" hangingPunct="1">
+      <a:defRPr sz="1200" kern="1200">
+        <a:solidFill>
+          <a:schemeClr val="tx1"/>
+        </a:solidFill>
+        <a:latin typeface="+mn-lt"/>
+        <a:ea typeface="+mn-ea"/>
+        <a:cs typeface="+mn-cs"/>
+      </a:defRPr>
+    </a:lvl3pPr>
+    <a:lvl4pPr marL="1371600" algn="l" defTabSz="914400" rtl="0" eaLnBrk="1" latinLnBrk="0" hangingPunct="1">
+      <a:defRPr sz="1200" kern="1200">
+        <a:solidFill>
+          <a:schemeClr val="tx1"/>
+        </a:solidFill>
+        <a:latin typeface="+mn-lt"/>
+        <a:ea typeface="+mn-ea"/>
+        <a:cs typeface="+mn-cs"/>
+      </a:defRPr>
+    </a:lvl4pPr>
+    <a:lvl5pPr marL="1828800" algn="l" defTabSz="914400" rtl="0" eaLnBrk="1" latinLnBrk="0" hangingPunct="1">
+      <a:defRPr sz="1200" kern="1200">
+        <a:solidFill>
+          <a:schemeClr val="tx1"/>
+        </a:solidFill>
+        <a:latin typeface="+mn-lt"/>
+        <a:ea typeface="+mn-ea"/>
+        <a:cs typeface="+mn-cs"/>
+      </a:defRPr>
+    </a:lvl5pPr>
+    <a:lvl6pPr marL="2286000" algn="l" defTabSz="914400" rtl="0" eaLnBrk="1" latinLnBrk="0" hangingPunct="1">
+      <a:defRPr sz="1200" kern="1200">
+        <a:solidFill>
+          <a:schemeClr val="tx1"/>
+        </a:solidFill>
+        <a:latin typeface="+mn-lt"/>
+        <a:ea typeface="+mn-ea"/>
+        <a:cs typeface="+mn-cs"/>
+      </a:defRPr>
+    </a:lvl6pPr>
+    <a:lvl7pPr marL="2743200" algn="l" defTabSz="914400" rtl="0" eaLnBrk="1" latinLnBrk="0" hangingPunct="1">
+      <a:defRPr sz="1200" kern="1200">
+        <a:solidFill>
+          <a:schemeClr val="tx1"/>
+        </a:solidFill>
+        <a:latin typeface="+mn-lt"/>
+        <a:ea typeface="+mn-ea"/>
+        <a:cs typeface="+mn-cs"/>
+      </a:defRPr>
+    </a:lvl7pPr>
+    <a:lvl8pPr marL="3200400" algn="l" defTabSz="914400" rtl="0" eaLnBrk="1" latinLnBrk="0" hangingPunct="1">
+      <a:defRPr sz="1200" kern="1200">
+        <a:solidFill>
+          <a:schemeClr val="tx1"/>
+        </a:solidFill>
+        <a:latin typeface="+mn-lt"/>
+        <a:ea typeface="+mn-ea"/>
+        <a:cs typeface="+mn-cs"/>
+      </a:defRPr>
+    </a:lvl8pPr>
+    <a:lvl9pPr marL="3657600" algn="l" defTabSz="914400" rtl="0" eaLnBrk="1" latinLnBrk="0" hangingPunct="1">
+      <a:defRPr sz="1200" kern="1200">
+        <a:solidFill>
+          <a:schemeClr val="tx1"/>
+        </a:solidFill>
+        <a:latin typeface="+mn-lt"/>
+        <a:ea typeface="+mn-ea"/>
+        <a:cs typeface="+mn-cs"/>
+      </a:defRPr>
+    </a:lvl9pPr>
+  </p:notesStyle>
+</p:notesMaster>
+</file>
+
+<file path=ppt/notesSlides/notesSlide1.xml><?xml version="1.0" encoding="utf-8"?>
+<p:notes xmlns:a="http://schemas.openxmlformats.org/drawingml/2006/main" xmlns:r="http://schemas.openxmlformats.org/officeDocument/2006/relationships" xmlns:p="http://schemas.openxmlformats.org/presentationml/2006/main">
+  <p:cSld>
+    <p:spTree>
+      <p:nvGrpSpPr>
+        <p:cNvPr id="1" name=""/>
+        <p:cNvGrpSpPr/>
+        <p:nvPr/>
+      </p:nvGrpSpPr>
+      <p:grpSpPr>
+        <a:xfrm>
+          <a:off x="0" y="0"/>
+          <a:ext cx="0" cy="0"/>
+          <a:chOff x="0" y="0"/>
+          <a:chExt cx="0" cy="0"/>
+        </a:xfrm>
+      </p:grpSpPr>
+      <p:sp>
+        <p:nvSpPr>
+          <p:cNvPr id="2" name="Slide Image Placeholder 1"/>
+          <p:cNvSpPr>
+            <a:spLocks noGrp="1" noRot="1" noChangeAspect="1"/>
+          </p:cNvSpPr>
+          <p:nvPr>
+            <p:ph type="sldImg"/>
+          </p:nvPr>
+        </p:nvSpPr>
+        <p:spPr/>
+      </p:sp>
+      <p:sp>
+        <p:nvSpPr>
+          <p:cNvPr id="3" name="Notes Placeholder 2"/>
+          <p:cNvSpPr>
+            <a:spLocks noGrp="1"/>
+          </p:cNvSpPr>
+          <p:nvPr>
+            <p:ph type="body" idx="1"/>
+          </p:nvPr>
+        </p:nvSpPr>
+        <p:spPr/>
+        <p:txBody>
+          <a:bodyPr/>
+          <a:lstStyle/>
+          <a:p>
+            <a:r>
+              <a:rPr lang="en-US" b="0" i="0" dirty="0">
+                <a:solidFill>
+                  <a:srgbClr val="1B1B1B"/>
+                </a:solidFill>
+                <a:effectLst/>
+                <a:latin typeface="Heebo"/>
+              </a:rPr>
+              <a:t>China is the world’s biggest beer producer with over 47 million kiloliters per year</a:t>
+            </a:r>
+          </a:p>
+          <a:p>
+            <a:r>
+              <a:rPr lang="en-US" b="0" i="0" dirty="0">
+                <a:solidFill>
+                  <a:srgbClr val="1B1B1B"/>
+                </a:solidFill>
+                <a:effectLst/>
+                <a:latin typeface="Heebo"/>
+              </a:rPr>
+              <a:t>The Czech Republic consumed 2,033 million liters of beer in 2018</a:t>
+            </a:r>
+          </a:p>
+          <a:p>
+            <a:r>
+              <a:rPr lang="en-US" b="0" i="0" dirty="0">
+                <a:solidFill>
+                  <a:srgbClr val="1B1B1B"/>
+                </a:solidFill>
+                <a:effectLst/>
+                <a:latin typeface="Heebo"/>
+              </a:rPr>
+              <a:t>McDonald’s sells beer on its menu in many countries such as France, Germany, Portugal, and South Korea</a:t>
+            </a:r>
+          </a:p>
+          <a:p>
+            <a:r>
+              <a:rPr lang="en-US" b="0" i="0" dirty="0">
+                <a:solidFill>
+                  <a:srgbClr val="1B1B1B"/>
+                </a:solidFill>
+                <a:effectLst/>
+                <a:latin typeface="Heebo"/>
+              </a:rPr>
+              <a:t>‘Snake Venom’ is the strongest beer in the world with 67.5% alcohol by volume</a:t>
+            </a:r>
+          </a:p>
+          <a:p>
+            <a:r>
+              <a:rPr lang="en-US" b="0" i="0" dirty="0">
+                <a:solidFill>
+                  <a:srgbClr val="DC1C1C"/>
+                </a:solidFill>
+                <a:effectLst/>
+                <a:latin typeface="Heebo"/>
+              </a:rPr>
+              <a:t>China consumes the most beer as a whole</a:t>
+            </a:r>
+            <a:endParaRPr lang="en-US" b="0" i="0" dirty="0">
+              <a:solidFill>
+                <a:srgbClr val="1B1B1B"/>
+              </a:solidFill>
+              <a:effectLst/>
+              <a:latin typeface="Heebo"/>
+            </a:endParaRPr>
+          </a:p>
+          <a:p>
+            <a:r>
+              <a:rPr lang="en-US" b="0" i="0" dirty="0">
+                <a:solidFill>
+                  <a:srgbClr val="1B1B1B"/>
+                </a:solidFill>
+                <a:effectLst/>
+                <a:latin typeface="Heebo"/>
+              </a:rPr>
+              <a:t>Every year, the US generates profits of over 100 billion dollars from beer alone</a:t>
+            </a:r>
+          </a:p>
+          <a:p>
+            <a:r>
+              <a:rPr lang="en-US" b="0" i="0" dirty="0">
+                <a:solidFill>
+                  <a:srgbClr val="1B1B1B"/>
+                </a:solidFill>
+                <a:effectLst/>
+                <a:latin typeface="Heebo"/>
+              </a:rPr>
+              <a:t>The Pilsner’s name came from the Czech city of Pilsen (</a:t>
+            </a:r>
+            <a:r>
+              <a:rPr lang="en-US" b="0" i="1" dirty="0" err="1">
+                <a:solidFill>
+                  <a:srgbClr val="1B1B1B"/>
+                </a:solidFill>
+                <a:effectLst/>
+                <a:latin typeface="Heebo"/>
+              </a:rPr>
+              <a:t>Plzeň</a:t>
+            </a:r>
+            <a:r>
+              <a:rPr lang="en-US" b="0" i="0" dirty="0">
+                <a:solidFill>
+                  <a:srgbClr val="1B1B1B"/>
+                </a:solidFill>
+                <a:effectLst/>
+                <a:latin typeface="Heebo"/>
+              </a:rPr>
+              <a:t>) </a:t>
+            </a:r>
+          </a:p>
+          <a:p>
+            <a:pPr marL="0" marR="0" lvl="0" indent="0" algn="l" defTabSz="914400" rtl="0" eaLnBrk="1" fontAlgn="auto" latinLnBrk="0" hangingPunct="1">
+              <a:lnSpc>
+                <a:spcPct val="100000"/>
+              </a:lnSpc>
+              <a:spcBef>
+                <a:spcPts val="0"/>
+              </a:spcBef>
+              <a:spcAft>
+                <a:spcPts val="0"/>
+              </a:spcAft>
+              <a:buClrTx/>
+              <a:buSzTx/>
+              <a:buFontTx/>
+              <a:buNone/>
+              <a:tabLst/>
+              <a:defRPr/>
+            </a:pPr>
+            <a:r>
+              <a:rPr lang="en-US" b="0" i="0" dirty="0">
+                <a:solidFill>
+                  <a:srgbClr val="1B1B1B"/>
+                </a:solidFill>
+                <a:effectLst/>
+                <a:latin typeface="Heebo"/>
+              </a:rPr>
+              <a:t>Craft beer is more prized than commercial beer</a:t>
+            </a:r>
+          </a:p>
+          <a:p>
+            <a:pPr marL="0" marR="0" lvl="0" indent="0" algn="l" defTabSz="914400" rtl="0" eaLnBrk="1" fontAlgn="auto" latinLnBrk="0" hangingPunct="1">
+              <a:lnSpc>
+                <a:spcPct val="100000"/>
+              </a:lnSpc>
+              <a:spcBef>
+                <a:spcPts val="0"/>
+              </a:spcBef>
+              <a:spcAft>
+                <a:spcPts val="0"/>
+              </a:spcAft>
+              <a:buClrTx/>
+              <a:buSzTx/>
+              <a:buFontTx/>
+              <a:buNone/>
+              <a:tabLst/>
+              <a:defRPr/>
+            </a:pPr>
+            <a:r>
+              <a:rPr lang="en-US" b="0" i="0" dirty="0">
+                <a:solidFill>
+                  <a:srgbClr val="1B1B1B"/>
+                </a:solidFill>
+                <a:effectLst/>
+                <a:latin typeface="Heebo"/>
+              </a:rPr>
+              <a:t>Drinking stout could help fight cancer</a:t>
+            </a:r>
+          </a:p>
+          <a:p>
+            <a:endParaRPr lang="en-AU" dirty="0"/>
+          </a:p>
+          <a:p>
+            <a:r>
+              <a:rPr lang="en-US" b="0" i="0" dirty="0">
+                <a:solidFill>
+                  <a:srgbClr val="1B1B1B"/>
+                </a:solidFill>
+                <a:effectLst/>
+                <a:latin typeface="Heebo"/>
+              </a:rPr>
+              <a:t>Storing any kind of beer above 12° C will deteriorate its flavor and quality</a:t>
+            </a:r>
+            <a:endParaRPr lang="en-AU" b="0" i="0" dirty="0">
+              <a:solidFill>
+                <a:srgbClr val="1B1B1B"/>
+              </a:solidFill>
+              <a:effectLst/>
+              <a:latin typeface="Heebo"/>
+            </a:endParaRPr>
+          </a:p>
+          <a:p>
+            <a:pPr marL="0" marR="0" lvl="0" indent="0" algn="l" defTabSz="914400" rtl="0" eaLnBrk="1" fontAlgn="auto" latinLnBrk="0" hangingPunct="1">
+              <a:lnSpc>
+                <a:spcPct val="100000"/>
+              </a:lnSpc>
+              <a:spcBef>
+                <a:spcPts val="0"/>
+              </a:spcBef>
+              <a:spcAft>
+                <a:spcPts val="0"/>
+              </a:spcAft>
+              <a:buClrTx/>
+              <a:buSzTx/>
+              <a:buFontTx/>
+              <a:buNone/>
+              <a:tabLst/>
+              <a:defRPr/>
+            </a:pPr>
+            <a:r>
+              <a:rPr lang="en-US" b="1" i="0" dirty="0">
+                <a:solidFill>
+                  <a:srgbClr val="1B1B1B"/>
+                </a:solidFill>
+                <a:effectLst/>
+                <a:latin typeface="Heebo"/>
+              </a:rPr>
+              <a:t>There are several beer spas in the Czech Republic</a:t>
+            </a:r>
+          </a:p>
+          <a:p>
+            <a:pPr marL="0" marR="0" lvl="0" indent="0" algn="l" defTabSz="914400" rtl="0" eaLnBrk="1" fontAlgn="auto" latinLnBrk="0" hangingPunct="1">
+              <a:lnSpc>
+                <a:spcPct val="100000"/>
+              </a:lnSpc>
+              <a:spcBef>
+                <a:spcPts val="0"/>
+              </a:spcBef>
+              <a:spcAft>
+                <a:spcPts val="0"/>
+              </a:spcAft>
+              <a:buClrTx/>
+              <a:buSzTx/>
+              <a:buFontTx/>
+              <a:buNone/>
+              <a:tabLst/>
+              <a:defRPr/>
+            </a:pPr>
+            <a:r>
+              <a:rPr lang="en-US" b="1" i="0" dirty="0">
+                <a:solidFill>
+                  <a:srgbClr val="1B1B1B"/>
+                </a:solidFill>
+                <a:effectLst/>
+                <a:latin typeface="Heebo"/>
+              </a:rPr>
+              <a:t>Barack Obama brewed his own beer at the White House</a:t>
+            </a:r>
+          </a:p>
+          <a:p>
+            <a:pPr marL="0" marR="0" lvl="0" indent="0" algn="l" defTabSz="914400" rtl="0" eaLnBrk="1" fontAlgn="auto" latinLnBrk="0" hangingPunct="1">
+              <a:lnSpc>
+                <a:spcPct val="100000"/>
+              </a:lnSpc>
+              <a:spcBef>
+                <a:spcPts val="0"/>
+              </a:spcBef>
+              <a:spcAft>
+                <a:spcPts val="0"/>
+              </a:spcAft>
+              <a:buClrTx/>
+              <a:buSzTx/>
+              <a:buFontTx/>
+              <a:buNone/>
+              <a:tabLst/>
+              <a:defRPr/>
+            </a:pPr>
+            <a:r>
+              <a:rPr lang="en-US" b="1" i="0" dirty="0">
+                <a:solidFill>
+                  <a:srgbClr val="1B1B1B"/>
+                </a:solidFill>
+                <a:effectLst/>
+                <a:latin typeface="Heebo"/>
+              </a:rPr>
+              <a:t>Drinking beer reduces the risk of kidney stones</a:t>
+            </a:r>
+          </a:p>
+          <a:p>
+            <a:pPr marL="0" marR="0" lvl="0" indent="0" algn="l" defTabSz="914400" rtl="0" eaLnBrk="1" fontAlgn="auto" latinLnBrk="0" hangingPunct="1">
+              <a:lnSpc>
+                <a:spcPct val="100000"/>
+              </a:lnSpc>
+              <a:spcBef>
+                <a:spcPts val="0"/>
+              </a:spcBef>
+              <a:spcAft>
+                <a:spcPts val="0"/>
+              </a:spcAft>
+              <a:buClrTx/>
+              <a:buSzTx/>
+              <a:buFontTx/>
+              <a:buNone/>
+              <a:tabLst/>
+              <a:defRPr/>
+            </a:pPr>
+            <a:r>
+              <a:rPr lang="en-US" b="1" i="0" dirty="0">
+                <a:solidFill>
+                  <a:srgbClr val="1B1B1B"/>
+                </a:solidFill>
+                <a:effectLst/>
+                <a:latin typeface="Heebo"/>
+              </a:rPr>
+              <a:t>Beer can also lower the risk of coronary heart disease</a:t>
+            </a:r>
+          </a:p>
+          <a:p>
+            <a:pPr marL="0" marR="0" lvl="0" indent="0" algn="l" defTabSz="914400" rtl="0" eaLnBrk="1" fontAlgn="auto" latinLnBrk="0" hangingPunct="1">
+              <a:lnSpc>
+                <a:spcPct val="100000"/>
+              </a:lnSpc>
+              <a:spcBef>
+                <a:spcPts val="0"/>
+              </a:spcBef>
+              <a:spcAft>
+                <a:spcPts val="0"/>
+              </a:spcAft>
+              <a:buClrTx/>
+              <a:buSzTx/>
+              <a:buFontTx/>
+              <a:buNone/>
+              <a:tabLst/>
+              <a:defRPr/>
+            </a:pPr>
+            <a:r>
+              <a:rPr lang="en-US" b="1" i="0" dirty="0">
+                <a:solidFill>
+                  <a:srgbClr val="1B1B1B"/>
+                </a:solidFill>
+                <a:effectLst/>
+                <a:latin typeface="Heebo"/>
+              </a:rPr>
+              <a:t>Drinking beer significantly lowers the risk of developing type 2 diabetes</a:t>
+            </a:r>
+          </a:p>
+          <a:p>
+            <a:endParaRPr lang="en-AU" b="0" i="0" dirty="0">
+              <a:solidFill>
+                <a:srgbClr val="1B1B1B"/>
+              </a:solidFill>
+              <a:effectLst/>
+              <a:latin typeface="Heebo"/>
+            </a:endParaRPr>
+          </a:p>
+          <a:p>
+            <a:pPr marL="0" marR="0" lvl="0" indent="0" algn="l" defTabSz="914400" rtl="0" eaLnBrk="1" fontAlgn="auto" latinLnBrk="0" hangingPunct="1">
+              <a:lnSpc>
+                <a:spcPct val="100000"/>
+              </a:lnSpc>
+              <a:spcBef>
+                <a:spcPts val="0"/>
+              </a:spcBef>
+              <a:spcAft>
+                <a:spcPts val="0"/>
+              </a:spcAft>
+              <a:buClrTx/>
+              <a:buSzTx/>
+              <a:buFontTx/>
+              <a:buNone/>
+              <a:tabLst/>
+              <a:defRPr/>
+            </a:pPr>
+            <a:r>
+              <a:rPr lang="en-US" b="1" i="0" dirty="0">
+                <a:solidFill>
+                  <a:srgbClr val="1B1B1B"/>
+                </a:solidFill>
+                <a:effectLst/>
+                <a:latin typeface="Heebo"/>
+              </a:rPr>
+              <a:t>Drinking beer increases good cholesterol</a:t>
+            </a:r>
+          </a:p>
+          <a:p>
+            <a:pPr marL="0" marR="0" lvl="0" indent="0" algn="l" defTabSz="914400" rtl="0" eaLnBrk="1" fontAlgn="auto" latinLnBrk="0" hangingPunct="1">
+              <a:lnSpc>
+                <a:spcPct val="100000"/>
+              </a:lnSpc>
+              <a:spcBef>
+                <a:spcPts val="0"/>
+              </a:spcBef>
+              <a:spcAft>
+                <a:spcPts val="0"/>
+              </a:spcAft>
+              <a:buClrTx/>
+              <a:buSzTx/>
+              <a:buFontTx/>
+              <a:buNone/>
+              <a:tabLst/>
+              <a:defRPr/>
+            </a:pPr>
+            <a:r>
+              <a:rPr lang="en-US" b="1" i="0" dirty="0">
+                <a:solidFill>
+                  <a:srgbClr val="1B1B1B"/>
+                </a:solidFill>
+                <a:effectLst/>
+                <a:latin typeface="Heebo"/>
+              </a:rPr>
+              <a:t>Beer drinkers are better thinkers at old age</a:t>
+            </a:r>
+          </a:p>
+          <a:p>
+            <a:endParaRPr lang="en-AU" dirty="0"/>
+          </a:p>
+        </p:txBody>
+      </p:sp>
+      <p:sp>
+        <p:nvSpPr>
+          <p:cNvPr id="4" name="Slide Number Placeholder 3"/>
+          <p:cNvSpPr>
+            <a:spLocks noGrp="1"/>
+          </p:cNvSpPr>
+          <p:nvPr>
+            <p:ph type="sldNum" sz="quarter" idx="5"/>
+          </p:nvPr>
+        </p:nvSpPr>
+        <p:spPr/>
+        <p:txBody>
+          <a:bodyPr/>
+          <a:lstStyle/>
+          <a:p>
+            <a:fld id="{068BBB84-BA30-4708-A5F1-8EA79474F327}" type="slidenum">
+              <a:rPr lang="en-AU" smtClean="0"/>
+              <a:t>2</a:t>
+            </a:fld>
+            <a:endParaRPr lang="en-AU"/>
+          </a:p>
+        </p:txBody>
+      </p:sp>
+    </p:spTree>
+    <p:extLst>
+      <p:ext uri="{BB962C8B-B14F-4D97-AF65-F5344CB8AC3E}">
+        <p14:creationId xmlns:p14="http://schemas.microsoft.com/office/powerpoint/2010/main" val="1494145838"/>
+      </p:ext>
+    </p:extLst>
+  </p:cSld>
+  <p:clrMapOvr>
+    <a:masterClrMapping/>
+  </p:clrMapOvr>
+</p:notes>
+</file>
+
+<file path=ppt/notesSlides/notesSlide2.xml><?xml version="1.0" encoding="utf-8"?>
+<p:notes xmlns:a="http://schemas.openxmlformats.org/drawingml/2006/main" xmlns:r="http://schemas.openxmlformats.org/officeDocument/2006/relationships" xmlns:p="http://schemas.openxmlformats.org/presentationml/2006/main">
+  <p:cSld>
+    <p:spTree>
+      <p:nvGrpSpPr>
+        <p:cNvPr id="1" name=""/>
+        <p:cNvGrpSpPr/>
+        <p:nvPr/>
+      </p:nvGrpSpPr>
+      <p:grpSpPr>
+        <a:xfrm>
+          <a:off x="0" y="0"/>
+          <a:ext cx="0" cy="0"/>
+          <a:chOff x="0" y="0"/>
+          <a:chExt cx="0" cy="0"/>
+        </a:xfrm>
+      </p:grpSpPr>
+      <p:sp>
+        <p:nvSpPr>
+          <p:cNvPr id="2" name="Slide Image Placeholder 1"/>
+          <p:cNvSpPr>
+            <a:spLocks noGrp="1" noRot="1" noChangeAspect="1"/>
+          </p:cNvSpPr>
+          <p:nvPr>
+            <p:ph type="sldImg"/>
+          </p:nvPr>
+        </p:nvSpPr>
+        <p:spPr/>
+      </p:sp>
+      <p:sp>
+        <p:nvSpPr>
+          <p:cNvPr id="3" name="Notes Placeholder 2"/>
+          <p:cNvSpPr>
+            <a:spLocks noGrp="1"/>
+          </p:cNvSpPr>
+          <p:nvPr>
+            <p:ph type="body" idx="1"/>
+          </p:nvPr>
+        </p:nvSpPr>
+        <p:spPr/>
+        <p:txBody>
+          <a:bodyPr/>
+          <a:lstStyle/>
+          <a:p>
+            <a:endParaRPr lang="en-AU" dirty="0"/>
+          </a:p>
+        </p:txBody>
+      </p:sp>
+      <p:sp>
+        <p:nvSpPr>
+          <p:cNvPr id="4" name="Slide Number Placeholder 3"/>
+          <p:cNvSpPr>
+            <a:spLocks noGrp="1"/>
+          </p:cNvSpPr>
+          <p:nvPr>
+            <p:ph type="sldNum" sz="quarter" idx="5"/>
+          </p:nvPr>
+        </p:nvSpPr>
+        <p:spPr/>
+        <p:txBody>
+          <a:bodyPr/>
+          <a:lstStyle/>
+          <a:p>
+            <a:fld id="{068BBB84-BA30-4708-A5F1-8EA79474F327}" type="slidenum">
+              <a:rPr lang="en-AU" smtClean="0"/>
+              <a:t>3</a:t>
+            </a:fld>
+            <a:endParaRPr lang="en-AU"/>
+          </a:p>
+        </p:txBody>
+      </p:sp>
+    </p:spTree>
+    <p:extLst>
+      <p:ext uri="{BB962C8B-B14F-4D97-AF65-F5344CB8AC3E}">
+        <p14:creationId xmlns:p14="http://schemas.microsoft.com/office/powerpoint/2010/main" val="2255240415"/>
+      </p:ext>
+    </p:extLst>
+  </p:cSld>
+  <p:clrMapOvr>
+    <a:masterClrMapping/>
+  </p:clrMapOvr>
+</p:notes>
+</file>
+
+<file path=ppt/notesSlides/notesSlide3.xml><?xml version="1.0" encoding="utf-8"?>
+<p:notes xmlns:a="http://schemas.openxmlformats.org/drawingml/2006/main" xmlns:r="http://schemas.openxmlformats.org/officeDocument/2006/relationships" xmlns:p="http://schemas.openxmlformats.org/presentationml/2006/main">
+  <p:cSld>
+    <p:spTree>
+      <p:nvGrpSpPr>
+        <p:cNvPr id="1" name=""/>
+        <p:cNvGrpSpPr/>
+        <p:nvPr/>
+      </p:nvGrpSpPr>
+      <p:grpSpPr>
+        <a:xfrm>
+          <a:off x="0" y="0"/>
+          <a:ext cx="0" cy="0"/>
+          <a:chOff x="0" y="0"/>
+          <a:chExt cx="0" cy="0"/>
+        </a:xfrm>
+      </p:grpSpPr>
+      <p:sp>
+        <p:nvSpPr>
+          <p:cNvPr id="2" name="Slide Image Placeholder 1"/>
+          <p:cNvSpPr>
+            <a:spLocks noGrp="1" noRot="1" noChangeAspect="1"/>
+          </p:cNvSpPr>
+          <p:nvPr>
+            <p:ph type="sldImg"/>
+          </p:nvPr>
+        </p:nvSpPr>
+        <p:spPr/>
+      </p:sp>
+      <p:sp>
+        <p:nvSpPr>
+          <p:cNvPr id="3" name="Notes Placeholder 2"/>
+          <p:cNvSpPr>
+            <a:spLocks noGrp="1"/>
+          </p:cNvSpPr>
+          <p:nvPr>
+            <p:ph type="body" idx="1"/>
+          </p:nvPr>
+        </p:nvSpPr>
+        <p:spPr/>
+        <p:txBody>
+          <a:bodyPr/>
+          <a:lstStyle/>
+          <a:p>
+            <a:pPr rtl="0">
+              <a:spcBef>
+                <a:spcPts val="1000"/>
+              </a:spcBef>
+              <a:spcAft>
+                <a:spcPts val="0"/>
+              </a:spcAft>
+            </a:pPr>
+            <a:r>
+              <a:rPr lang="en-US" sz="1000" b="0" i="0" u="none" strike="noStrike" dirty="0">
+                <a:solidFill>
+                  <a:srgbClr val="000000"/>
+                </a:solidFill>
+                <a:effectLst/>
+                <a:latin typeface="Lustria"/>
+              </a:rPr>
+              <a:t>** Started with a </a:t>
+            </a:r>
+            <a:r>
+              <a:rPr lang="en-US" sz="1000" b="0" i="0" u="none" strike="noStrike" dirty="0" err="1">
+                <a:solidFill>
+                  <a:srgbClr val="000000"/>
+                </a:solidFill>
+                <a:effectLst/>
+                <a:latin typeface="Lustria"/>
+              </a:rPr>
+              <a:t>DataWorld</a:t>
+            </a:r>
+            <a:r>
+              <a:rPr lang="en-US" sz="1000" b="0" i="0" u="none" strike="noStrike" dirty="0">
+                <a:solidFill>
+                  <a:srgbClr val="000000"/>
+                </a:solidFill>
+                <a:effectLst/>
+                <a:latin typeface="Lustria"/>
+              </a:rPr>
+              <a:t> dataset</a:t>
+            </a:r>
+            <a:endParaRPr lang="en-US" sz="1000" b="0" dirty="0">
+              <a:effectLst/>
+            </a:endParaRPr>
+          </a:p>
+          <a:p>
+            <a:pPr rtl="0">
+              <a:spcBef>
+                <a:spcPts val="1000"/>
+              </a:spcBef>
+              <a:spcAft>
+                <a:spcPts val="0"/>
+              </a:spcAft>
+            </a:pPr>
+            <a:r>
+              <a:rPr lang="en-US" sz="1000" b="0" i="0" u="none" strike="noStrike" dirty="0">
+                <a:solidFill>
+                  <a:srgbClr val="000000"/>
+                </a:solidFill>
+                <a:effectLst/>
+                <a:latin typeface="Lustria"/>
+              </a:rPr>
+              <a:t>** the stats - 1.5m reviews, 5k breweries and 16k unique beers</a:t>
+            </a:r>
+            <a:endParaRPr lang="en-US" sz="1000" b="0" dirty="0">
+              <a:effectLst/>
+            </a:endParaRPr>
+          </a:p>
+          <a:p>
+            <a:pPr rtl="0">
+              <a:spcBef>
+                <a:spcPts val="1000"/>
+              </a:spcBef>
+              <a:spcAft>
+                <a:spcPts val="0"/>
+              </a:spcAft>
+            </a:pPr>
+            <a:r>
+              <a:rPr lang="en-US" sz="1000" b="0" i="0" u="none" strike="noStrike" dirty="0">
+                <a:solidFill>
+                  <a:srgbClr val="000000"/>
+                </a:solidFill>
+                <a:effectLst/>
+                <a:latin typeface="Lustria"/>
+              </a:rPr>
+              <a:t>** 13 fields, broken down into:</a:t>
+            </a:r>
+            <a:endParaRPr lang="en-US" sz="1000" b="0" dirty="0">
+              <a:effectLst/>
+            </a:endParaRPr>
+          </a:p>
+          <a:p>
+            <a:pPr rtl="0">
+              <a:spcBef>
+                <a:spcPts val="1000"/>
+              </a:spcBef>
+              <a:spcAft>
+                <a:spcPts val="0"/>
+              </a:spcAft>
+            </a:pPr>
+            <a:r>
+              <a:rPr lang="en-US" sz="1000" b="0" i="0" u="none" strike="noStrike" dirty="0">
+                <a:solidFill>
+                  <a:srgbClr val="000000"/>
+                </a:solidFill>
+                <a:effectLst/>
+                <a:latin typeface="Lustria"/>
+              </a:rPr>
+              <a:t>2 identifiers (brewery and beer) each with a descriptor</a:t>
+            </a:r>
+            <a:endParaRPr lang="en-US" sz="1000" b="0" dirty="0">
+              <a:effectLst/>
+            </a:endParaRPr>
+          </a:p>
+          <a:p>
+            <a:pPr rtl="0">
+              <a:spcBef>
+                <a:spcPts val="1000"/>
+              </a:spcBef>
+              <a:spcAft>
+                <a:spcPts val="0"/>
+              </a:spcAft>
+            </a:pPr>
+            <a:r>
+              <a:rPr lang="en-US" sz="1000" b="0" i="0" u="none" strike="noStrike" dirty="0">
+                <a:solidFill>
+                  <a:srgbClr val="000000"/>
+                </a:solidFill>
+                <a:effectLst/>
+                <a:latin typeface="Lustria"/>
+              </a:rPr>
+              <a:t>5 review scores for different ‘features’ of a beer + it’s alcohol content (abv)</a:t>
+            </a:r>
+            <a:endParaRPr lang="en-US" sz="1000" b="0" dirty="0">
+              <a:effectLst/>
+            </a:endParaRPr>
+          </a:p>
+          <a:p>
+            <a:pPr rtl="0">
+              <a:spcBef>
+                <a:spcPts val="1000"/>
+              </a:spcBef>
+              <a:spcAft>
+                <a:spcPts val="0"/>
+              </a:spcAft>
+            </a:pPr>
+            <a:r>
+              <a:rPr lang="en-US" sz="1000" b="0" i="0" u="none" strike="noStrike" dirty="0">
+                <a:solidFill>
+                  <a:srgbClr val="000000"/>
+                </a:solidFill>
+                <a:effectLst/>
+                <a:latin typeface="Lustria"/>
+              </a:rPr>
+              <a:t>a time stamp and the </a:t>
+            </a:r>
+            <a:r>
+              <a:rPr lang="en-US" sz="1000" b="0" i="0" u="none" strike="noStrike" dirty="0" err="1">
+                <a:solidFill>
+                  <a:srgbClr val="000000"/>
+                </a:solidFill>
+                <a:effectLst/>
+                <a:latin typeface="Lustria"/>
+              </a:rPr>
+              <a:t>profilename</a:t>
+            </a:r>
+            <a:r>
+              <a:rPr lang="en-US" sz="1000" b="0" i="0" u="none" strike="noStrike" dirty="0">
+                <a:solidFill>
+                  <a:srgbClr val="000000"/>
+                </a:solidFill>
+                <a:effectLst/>
+                <a:latin typeface="Lustria"/>
+              </a:rPr>
+              <a:t> of the reviewer</a:t>
+            </a:r>
+            <a:endParaRPr lang="en-US" sz="1000" b="0" dirty="0">
+              <a:effectLst/>
+            </a:endParaRPr>
+          </a:p>
+          <a:p>
+            <a:pPr rtl="0">
+              <a:spcBef>
+                <a:spcPts val="1000"/>
+              </a:spcBef>
+              <a:spcAft>
+                <a:spcPts val="0"/>
+              </a:spcAft>
+            </a:pPr>
+            <a:r>
+              <a:rPr lang="en-US" sz="1000" b="0" i="0" u="none" strike="noStrike" dirty="0">
+                <a:solidFill>
+                  <a:srgbClr val="000000"/>
+                </a:solidFill>
+                <a:effectLst/>
+                <a:latin typeface="Lustria"/>
+              </a:rPr>
+              <a:t>** Dataset relatively ‘clean’ so focus shifted quickly to data profiling</a:t>
+            </a:r>
+            <a:endParaRPr lang="en-US" sz="1000" b="0" dirty="0">
+              <a:effectLst/>
+            </a:endParaRPr>
+          </a:p>
+          <a:p>
+            <a:pPr rtl="0">
+              <a:spcBef>
+                <a:spcPts val="1000"/>
+              </a:spcBef>
+              <a:spcAft>
+                <a:spcPts val="0"/>
+              </a:spcAft>
+            </a:pPr>
+            <a:r>
+              <a:rPr lang="en-US" sz="1000" b="0" i="0" u="none" strike="noStrike" dirty="0">
+                <a:solidFill>
+                  <a:srgbClr val="000000"/>
+                </a:solidFill>
+                <a:effectLst/>
+                <a:latin typeface="Lustria"/>
+              </a:rPr>
+              <a:t>** Validated high alcohol content beers which appeared to be outliers initially</a:t>
+            </a:r>
+            <a:endParaRPr lang="en-US" sz="1000" b="0" dirty="0">
+              <a:effectLst/>
+            </a:endParaRPr>
+          </a:p>
+          <a:p>
+            <a:pPr rtl="0">
+              <a:spcBef>
+                <a:spcPts val="1000"/>
+              </a:spcBef>
+              <a:spcAft>
+                <a:spcPts val="0"/>
+              </a:spcAft>
+            </a:pPr>
+            <a:r>
+              <a:rPr lang="en-US" sz="1000" b="0" i="0" u="none" strike="noStrike" dirty="0">
+                <a:solidFill>
+                  <a:srgbClr val="000000"/>
+                </a:solidFill>
+                <a:effectLst/>
+                <a:latin typeface="Lustria"/>
+              </a:rPr>
+              <a:t>** Investigated high correlation in 5 review scores and discovered dataset skewed to the right - showing tendency to rate between 3-5</a:t>
+            </a:r>
+            <a:endParaRPr lang="en-US" sz="1000" b="0" dirty="0">
+              <a:effectLst/>
+            </a:endParaRPr>
+          </a:p>
+          <a:p>
+            <a:pPr rtl="0">
+              <a:spcBef>
+                <a:spcPts val="1000"/>
+              </a:spcBef>
+              <a:spcAft>
+                <a:spcPts val="0"/>
+              </a:spcAft>
+            </a:pPr>
+            <a:r>
+              <a:rPr lang="en-US" sz="1000" b="0" i="0" u="none" strike="noStrike" dirty="0">
+                <a:solidFill>
+                  <a:srgbClr val="000000"/>
+                </a:solidFill>
+                <a:effectLst/>
+                <a:latin typeface="Lustria"/>
+              </a:rPr>
+              <a:t>** Looked for bias in </a:t>
+            </a:r>
+            <a:r>
+              <a:rPr lang="en-US" sz="1000" b="0" i="0" u="none" strike="noStrike" dirty="0" err="1">
+                <a:solidFill>
+                  <a:srgbClr val="000000"/>
+                </a:solidFill>
+                <a:effectLst/>
+                <a:latin typeface="Lustria"/>
+              </a:rPr>
+              <a:t>profilenames</a:t>
+            </a:r>
+            <a:r>
+              <a:rPr lang="en-US" sz="1000" b="0" i="0" u="none" strike="noStrike" dirty="0">
+                <a:solidFill>
+                  <a:srgbClr val="000000"/>
+                </a:solidFill>
+                <a:effectLst/>
+                <a:latin typeface="Lustria"/>
+              </a:rPr>
+              <a:t> and timing of reviews</a:t>
+            </a:r>
+            <a:endParaRPr lang="en-US" sz="1000" b="0" dirty="0">
+              <a:effectLst/>
+            </a:endParaRPr>
+          </a:p>
+          <a:p>
+            <a:pPr rtl="0">
+              <a:spcBef>
+                <a:spcPts val="1000"/>
+              </a:spcBef>
+              <a:spcAft>
+                <a:spcPts val="0"/>
+              </a:spcAft>
+            </a:pPr>
+            <a:r>
+              <a:rPr lang="en-US" sz="1000" b="0" i="0" u="none" strike="noStrike" dirty="0">
+                <a:solidFill>
+                  <a:srgbClr val="000000"/>
+                </a:solidFill>
+                <a:effectLst/>
+                <a:latin typeface="Lustria"/>
+              </a:rPr>
+              <a:t>** Made decision to leave in/out reviews????</a:t>
+            </a:r>
+            <a:endParaRPr lang="en-US" sz="1000" b="0" dirty="0">
+              <a:effectLst/>
+            </a:endParaRPr>
+          </a:p>
+          <a:p>
+            <a:pPr rtl="0">
+              <a:spcBef>
+                <a:spcPts val="1000"/>
+              </a:spcBef>
+              <a:spcAft>
+                <a:spcPts val="0"/>
+              </a:spcAft>
+            </a:pPr>
+            <a:r>
+              <a:rPr lang="en-US" sz="1000" b="0" i="0" u="none" strike="noStrike" dirty="0">
+                <a:solidFill>
+                  <a:srgbClr val="000000"/>
+                </a:solidFill>
+                <a:effectLst/>
+                <a:latin typeface="Lustria"/>
+              </a:rPr>
+              <a:t>** As profiling evolved began to look for additional features to add in</a:t>
+            </a:r>
+            <a:endParaRPr lang="en-US" sz="1000" b="0" dirty="0">
+              <a:effectLst/>
+            </a:endParaRPr>
+          </a:p>
+          <a:p>
+            <a:br>
+              <a:rPr lang="en-US" sz="1000" dirty="0"/>
+            </a:br>
+            <a:endParaRPr lang="en-AU" sz="1000" dirty="0"/>
+          </a:p>
+        </p:txBody>
+      </p:sp>
+      <p:sp>
+        <p:nvSpPr>
+          <p:cNvPr id="4" name="Slide Number Placeholder 3"/>
+          <p:cNvSpPr>
+            <a:spLocks noGrp="1"/>
+          </p:cNvSpPr>
+          <p:nvPr>
+            <p:ph type="sldNum" sz="quarter" idx="5"/>
+          </p:nvPr>
+        </p:nvSpPr>
+        <p:spPr/>
+        <p:txBody>
+          <a:bodyPr/>
+          <a:lstStyle/>
+          <a:p>
+            <a:fld id="{068BBB84-BA30-4708-A5F1-8EA79474F327}" type="slidenum">
+              <a:rPr lang="en-AU" smtClean="0"/>
+              <a:t>5</a:t>
+            </a:fld>
+            <a:endParaRPr lang="en-AU"/>
+          </a:p>
+        </p:txBody>
+      </p:sp>
+    </p:spTree>
+    <p:extLst>
+      <p:ext uri="{BB962C8B-B14F-4D97-AF65-F5344CB8AC3E}">
+        <p14:creationId xmlns:p14="http://schemas.microsoft.com/office/powerpoint/2010/main" val="899179541"/>
+      </p:ext>
+    </p:extLst>
+  </p:cSld>
+  <p:clrMapOvr>
+    <a:masterClrMapping/>
+  </p:clrMapOvr>
+</p:notes>
+</file>
+
+<file path=ppt/notesSlides/notesSlide4.xml><?xml version="1.0" encoding="utf-8"?>
+<p:notes xmlns:a="http://schemas.openxmlformats.org/drawingml/2006/main" xmlns:r="http://schemas.openxmlformats.org/officeDocument/2006/relationships" xmlns:p="http://schemas.openxmlformats.org/presentationml/2006/main">
+  <p:cSld>
+    <p:spTree>
+      <p:nvGrpSpPr>
+        <p:cNvPr id="1" name=""/>
+        <p:cNvGrpSpPr/>
+        <p:nvPr/>
+      </p:nvGrpSpPr>
+      <p:grpSpPr>
+        <a:xfrm>
+          <a:off x="0" y="0"/>
+          <a:ext cx="0" cy="0"/>
+          <a:chOff x="0" y="0"/>
+          <a:chExt cx="0" cy="0"/>
+        </a:xfrm>
+      </p:grpSpPr>
+      <p:sp>
+        <p:nvSpPr>
+          <p:cNvPr id="2" name="Slide Image Placeholder 1"/>
+          <p:cNvSpPr>
+            <a:spLocks noGrp="1" noRot="1" noChangeAspect="1"/>
+          </p:cNvSpPr>
+          <p:nvPr>
+            <p:ph type="sldImg"/>
+          </p:nvPr>
+        </p:nvSpPr>
+        <p:spPr/>
+      </p:sp>
+      <p:sp>
+        <p:nvSpPr>
+          <p:cNvPr id="3" name="Notes Placeholder 2"/>
+          <p:cNvSpPr>
+            <a:spLocks noGrp="1"/>
+          </p:cNvSpPr>
+          <p:nvPr>
+            <p:ph type="body" idx="1"/>
+          </p:nvPr>
+        </p:nvSpPr>
+        <p:spPr/>
+        <p:txBody>
+          <a:bodyPr/>
+          <a:lstStyle/>
+          <a:p>
+            <a:pPr rtl="0">
+              <a:spcBef>
+                <a:spcPts val="1000"/>
+              </a:spcBef>
+              <a:spcAft>
+                <a:spcPts val="0"/>
+              </a:spcAft>
+            </a:pPr>
+            <a:r>
+              <a:rPr lang="en-US" sz="1800" b="0" i="0" u="none" strike="noStrike" dirty="0">
+                <a:solidFill>
+                  <a:srgbClr val="000000"/>
+                </a:solidFill>
+                <a:effectLst/>
+                <a:latin typeface="Lustria"/>
+              </a:rPr>
+              <a:t>** First stop (as always!) </a:t>
+            </a:r>
+            <a:r>
+              <a:rPr lang="en-US" sz="1800" b="0" i="0" u="none" strike="noStrike" dirty="0" err="1">
+                <a:solidFill>
+                  <a:srgbClr val="000000"/>
+                </a:solidFill>
+                <a:effectLst/>
+                <a:latin typeface="Lustria"/>
+              </a:rPr>
+              <a:t>lat</a:t>
+            </a:r>
+            <a:r>
+              <a:rPr lang="en-US" sz="1800" b="0" i="0" u="none" strike="noStrike" dirty="0">
+                <a:solidFill>
+                  <a:srgbClr val="000000"/>
+                </a:solidFill>
+                <a:effectLst/>
+                <a:latin typeface="Lustria"/>
+              </a:rPr>
+              <a:t>/</a:t>
+            </a:r>
+            <a:r>
+              <a:rPr lang="en-US" sz="1800" b="0" i="0" u="none" strike="noStrike" dirty="0" err="1">
+                <a:solidFill>
+                  <a:srgbClr val="000000"/>
+                </a:solidFill>
+                <a:effectLst/>
+                <a:latin typeface="Lustria"/>
+              </a:rPr>
+              <a:t>lon</a:t>
+            </a:r>
+            <a:r>
+              <a:rPr lang="en-US" sz="1800" b="0" i="0" u="none" strike="noStrike" dirty="0">
+                <a:solidFill>
+                  <a:srgbClr val="000000"/>
+                </a:solidFill>
+                <a:effectLst/>
+                <a:latin typeface="Lustria"/>
+              </a:rPr>
+              <a:t> - mapping feature - combination of Beer Advocate (source website) and google maps</a:t>
+            </a:r>
+            <a:endParaRPr lang="en-US" sz="1200" b="0" dirty="0">
+              <a:effectLst/>
+            </a:endParaRPr>
+          </a:p>
+          <a:p>
+            <a:pPr rtl="0">
+              <a:spcBef>
+                <a:spcPts val="1000"/>
+              </a:spcBef>
+              <a:spcAft>
+                <a:spcPts val="0"/>
+              </a:spcAft>
+            </a:pPr>
+            <a:r>
+              <a:rPr lang="en-US" sz="1800" b="0" i="0" u="none" strike="noStrike" dirty="0">
+                <a:solidFill>
+                  <a:srgbClr val="000000"/>
+                </a:solidFill>
+                <a:effectLst/>
+                <a:latin typeface="Lustria"/>
+              </a:rPr>
+              <a:t>** also ‘finessed’ the beer style values in the dataset, with a large number of ‘unique’ styles in the data,  creating a new aggregator</a:t>
+            </a:r>
+            <a:r>
+              <a:rPr lang="en-US" sz="1800" b="1" i="0" u="none" strike="noStrike" dirty="0">
+                <a:solidFill>
+                  <a:srgbClr val="000000"/>
+                </a:solidFill>
+                <a:effectLst/>
+                <a:latin typeface="Lustria"/>
+              </a:rPr>
+              <a:t> </a:t>
+            </a:r>
+            <a:r>
+              <a:rPr lang="en-US" sz="1800" b="1" i="0" u="none" strike="noStrike" dirty="0">
+                <a:solidFill>
+                  <a:srgbClr val="0000FF"/>
+                </a:solidFill>
+                <a:effectLst/>
+                <a:latin typeface="Lustria"/>
+              </a:rPr>
+              <a:t>(from 104 to 11 styles)</a:t>
+            </a:r>
+            <a:endParaRPr lang="en-US" sz="1200" b="0" dirty="0">
+              <a:effectLst/>
+            </a:endParaRPr>
+          </a:p>
+          <a:p>
+            <a:pPr rtl="0">
+              <a:spcBef>
+                <a:spcPts val="1000"/>
+              </a:spcBef>
+              <a:spcAft>
+                <a:spcPts val="0"/>
+              </a:spcAft>
+            </a:pPr>
+            <a:r>
+              <a:rPr lang="en-US" sz="1800" b="0" i="0" u="none" strike="noStrike" dirty="0">
+                <a:solidFill>
+                  <a:srgbClr val="000000"/>
+                </a:solidFill>
+                <a:effectLst/>
+                <a:latin typeface="Lustria"/>
+              </a:rPr>
+              <a:t>** observed number of retired beers whilst working with the dataset.  Field also included seasonal/annual availability so decided to add as a feature as well as quantify and decide whether to exclude</a:t>
+            </a:r>
+            <a:endParaRPr lang="en-US" sz="1200" b="0" dirty="0">
+              <a:effectLst/>
+            </a:endParaRPr>
+          </a:p>
+          <a:p>
+            <a:pPr rtl="0">
+              <a:spcBef>
+                <a:spcPts val="1000"/>
+              </a:spcBef>
+              <a:spcAft>
+                <a:spcPts val="0"/>
+              </a:spcAft>
+            </a:pPr>
+            <a:r>
+              <a:rPr lang="en-US" sz="1800" b="1" i="0" u="none" strike="noStrike" dirty="0">
+                <a:solidFill>
+                  <a:srgbClr val="0000FF"/>
+                </a:solidFill>
+                <a:effectLst/>
+                <a:latin typeface="Lustria"/>
+              </a:rPr>
+              <a:t>** words (sentiment analysis) - scraping reviewer sentiment including words (“start words”) rather than using stop words (used 173 in total) from beer sommelier tasting guides</a:t>
+            </a:r>
+            <a:endParaRPr lang="en-US" sz="1200" b="0" dirty="0">
+              <a:effectLst/>
+            </a:endParaRPr>
+          </a:p>
+          <a:p>
+            <a:br>
+              <a:rPr lang="en-US" sz="1200" b="0" dirty="0">
+                <a:effectLst/>
+              </a:rPr>
+            </a:br>
+            <a:endParaRPr lang="en-AU" sz="1000" dirty="0"/>
+          </a:p>
+        </p:txBody>
+      </p:sp>
+      <p:sp>
+        <p:nvSpPr>
+          <p:cNvPr id="4" name="Slide Number Placeholder 3"/>
+          <p:cNvSpPr>
+            <a:spLocks noGrp="1"/>
+          </p:cNvSpPr>
+          <p:nvPr>
+            <p:ph type="sldNum" sz="quarter" idx="5"/>
+          </p:nvPr>
+        </p:nvSpPr>
+        <p:spPr/>
+        <p:txBody>
+          <a:bodyPr/>
+          <a:lstStyle/>
+          <a:p>
+            <a:fld id="{068BBB84-BA30-4708-A5F1-8EA79474F327}" type="slidenum">
+              <a:rPr lang="en-AU" smtClean="0"/>
+              <a:t>6</a:t>
+            </a:fld>
+            <a:endParaRPr lang="en-AU"/>
+          </a:p>
+        </p:txBody>
+      </p:sp>
+    </p:spTree>
+    <p:extLst>
+      <p:ext uri="{BB962C8B-B14F-4D97-AF65-F5344CB8AC3E}">
+        <p14:creationId xmlns:p14="http://schemas.microsoft.com/office/powerpoint/2010/main" val="3577540197"/>
+      </p:ext>
+    </p:extLst>
+  </p:cSld>
+  <p:clrMapOvr>
+    <a:masterClrMapping/>
+  </p:clrMapOvr>
+</p:notes>
+</file>
+
 <file path=ppt/slideLayouts/slideLayout1.xml><?xml version="1.0" encoding="utf-8"?>
 <p:sldLayout xmlns:a="http://schemas.openxmlformats.org/drawingml/2006/main" xmlns:r="http://schemas.openxmlformats.org/officeDocument/2006/relationships" xmlns:p="http://schemas.openxmlformats.org/presentationml/2006/main" type="title" preserve="1">
   <p:cSld name="Title Slide">
@@ -7002,7 +9001,7 @@
           <a:p>
             <a:fld id="{0F7F453A-223E-49D1-BA8E-9D6D88194130}" type="datetimeFigureOut">
               <a:rPr lang="en-AU" smtClean="0"/>
-              <a:t>20/10/2020</a:t>
+              <a:t>24/10/2020</a:t>
             </a:fld>
             <a:endParaRPr lang="en-AU"/>
           </a:p>
@@ -7300,7 +9299,7 @@
           <a:p>
             <a:fld id="{0F7F453A-223E-49D1-BA8E-9D6D88194130}" type="datetimeFigureOut">
               <a:rPr lang="en-AU" smtClean="0"/>
-              <a:t>20/10/2020</a:t>
+              <a:t>24/10/2020</a:t>
             </a:fld>
             <a:endParaRPr lang="en-AU"/>
           </a:p>
@@ -7492,7 +9491,7 @@
           <a:p>
             <a:fld id="{0F7F453A-223E-49D1-BA8E-9D6D88194130}" type="datetimeFigureOut">
               <a:rPr lang="en-AU" smtClean="0"/>
-              <a:t>20/10/2020</a:t>
+              <a:t>24/10/2020</a:t>
             </a:fld>
             <a:endParaRPr lang="en-AU"/>
           </a:p>
@@ -7753,7 +9752,7 @@
           <a:p>
             <a:fld id="{0F7F453A-223E-49D1-BA8E-9D6D88194130}" type="datetimeFigureOut">
               <a:rPr lang="en-AU" smtClean="0"/>
-              <a:t>20/10/2020</a:t>
+              <a:t>24/10/2020</a:t>
             </a:fld>
             <a:endParaRPr lang="en-AU"/>
           </a:p>
@@ -8177,7 +10176,7 @@
           <a:p>
             <a:fld id="{0F7F453A-223E-49D1-BA8E-9D6D88194130}" type="datetimeFigureOut">
               <a:rPr lang="en-AU" smtClean="0"/>
-              <a:t>20/10/2020</a:t>
+              <a:t>24/10/2020</a:t>
             </a:fld>
             <a:endParaRPr lang="en-AU"/>
           </a:p>
@@ -8714,7 +10713,7 @@
           <a:p>
             <a:fld id="{0F7F453A-223E-49D1-BA8E-9D6D88194130}" type="datetimeFigureOut">
               <a:rPr lang="en-AU" smtClean="0"/>
-              <a:t>20/10/2020</a:t>
+              <a:t>24/10/2020</a:t>
             </a:fld>
             <a:endParaRPr lang="en-AU"/>
           </a:p>
@@ -9578,7 +11577,7 @@
           <a:p>
             <a:fld id="{0F7F453A-223E-49D1-BA8E-9D6D88194130}" type="datetimeFigureOut">
               <a:rPr lang="en-AU" smtClean="0"/>
-              <a:t>20/10/2020</a:t>
+              <a:t>24/10/2020</a:t>
             </a:fld>
             <a:endParaRPr lang="en-AU"/>
           </a:p>
@@ -9748,7 +11747,7 @@
           <a:p>
             <a:fld id="{0F7F453A-223E-49D1-BA8E-9D6D88194130}" type="datetimeFigureOut">
               <a:rPr lang="en-AU" smtClean="0"/>
-              <a:t>20/10/2020</a:t>
+              <a:t>24/10/2020</a:t>
             </a:fld>
             <a:endParaRPr lang="en-AU"/>
           </a:p>
@@ -9932,7 +11931,7 @@
           <a:p>
             <a:fld id="{0F7F453A-223E-49D1-BA8E-9D6D88194130}" type="datetimeFigureOut">
               <a:rPr lang="en-AU" smtClean="0"/>
-              <a:t>20/10/2020</a:t>
+              <a:t>24/10/2020</a:t>
             </a:fld>
             <a:endParaRPr lang="en-AU"/>
           </a:p>
@@ -10102,7 +12101,7 @@
           <a:p>
             <a:fld id="{0F7F453A-223E-49D1-BA8E-9D6D88194130}" type="datetimeFigureOut">
               <a:rPr lang="en-AU" smtClean="0"/>
-              <a:t>20/10/2020</a:t>
+              <a:t>24/10/2020</a:t>
             </a:fld>
             <a:endParaRPr lang="en-AU"/>
           </a:p>
@@ -10346,7 +12345,7 @@
           <a:p>
             <a:fld id="{0F7F453A-223E-49D1-BA8E-9D6D88194130}" type="datetimeFigureOut">
               <a:rPr lang="en-AU" smtClean="0"/>
-              <a:t>20/10/2020</a:t>
+              <a:t>24/10/2020</a:t>
             </a:fld>
             <a:endParaRPr lang="en-AU"/>
           </a:p>
@@ -10582,7 +12581,7 @@
           <a:p>
             <a:fld id="{0F7F453A-223E-49D1-BA8E-9D6D88194130}" type="datetimeFigureOut">
               <a:rPr lang="en-AU" smtClean="0"/>
-              <a:t>20/10/2020</a:t>
+              <a:t>24/10/2020</a:t>
             </a:fld>
             <a:endParaRPr lang="en-AU"/>
           </a:p>
@@ -11048,7 +13047,7 @@
           <a:p>
             <a:fld id="{0F7F453A-223E-49D1-BA8E-9D6D88194130}" type="datetimeFigureOut">
               <a:rPr lang="en-AU" smtClean="0"/>
-              <a:t>20/10/2020</a:t>
+              <a:t>24/10/2020</a:t>
             </a:fld>
             <a:endParaRPr lang="en-AU"/>
           </a:p>
@@ -11166,7 +13165,7 @@
           <a:p>
             <a:fld id="{0F7F453A-223E-49D1-BA8E-9D6D88194130}" type="datetimeFigureOut">
               <a:rPr lang="en-AU" smtClean="0"/>
-              <a:t>20/10/2020</a:t>
+              <a:t>24/10/2020</a:t>
             </a:fld>
             <a:endParaRPr lang="en-AU"/>
           </a:p>
@@ -11261,7 +13260,7 @@
           <a:p>
             <a:fld id="{0F7F453A-223E-49D1-BA8E-9D6D88194130}" type="datetimeFigureOut">
               <a:rPr lang="en-AU" smtClean="0"/>
-              <a:t>20/10/2020</a:t>
+              <a:t>24/10/2020</a:t>
             </a:fld>
             <a:endParaRPr lang="en-AU"/>
           </a:p>
@@ -11516,7 +13515,7 @@
           <a:p>
             <a:fld id="{0F7F453A-223E-49D1-BA8E-9D6D88194130}" type="datetimeFigureOut">
               <a:rPr lang="en-AU" smtClean="0"/>
-              <a:t>20/10/2020</a:t>
+              <a:t>24/10/2020</a:t>
             </a:fld>
             <a:endParaRPr lang="en-AU"/>
           </a:p>
@@ -11816,7 +13815,7 @@
           <a:p>
             <a:fld id="{0F7F453A-223E-49D1-BA8E-9D6D88194130}" type="datetimeFigureOut">
               <a:rPr lang="en-AU" smtClean="0"/>
-              <a:t>20/10/2020</a:t>
+              <a:t>24/10/2020</a:t>
             </a:fld>
             <a:endParaRPr lang="en-AU"/>
           </a:p>
@@ -12050,7 +14049,7 @@
           <a:p>
             <a:fld id="{0F7F453A-223E-49D1-BA8E-9D6D88194130}" type="datetimeFigureOut">
               <a:rPr lang="en-AU" smtClean="0"/>
-              <a:t>20/10/2020</a:t>
+              <a:t>24/10/2020</a:t>
             </a:fld>
             <a:endParaRPr lang="en-AU"/>
           </a:p>
@@ -12718,7 +14717,7 @@
           </a:blip>
           <a:srcRect/>
           <a:stretch>
-            <a:fillRect t="-9000" b="-9000"/>
+            <a:fillRect t="-4000" b="-4000"/>
           </a:stretch>
         </a:blipFill>
         <a:effectLst/>
@@ -12740,35 +14739,6 @@
       </p:grpSpPr>
       <p:sp>
         <p:nvSpPr>
-          <p:cNvPr id="2" name="Title 1">
-            <a:extLst>
-              <a:ext uri="{FF2B5EF4-FFF2-40B4-BE49-F238E27FC236}">
-                <a16:creationId xmlns:a16="http://schemas.microsoft.com/office/drawing/2014/main" id="{FEBA3F05-B368-43A7-8E01-284B2F2E4A58}"/>
-              </a:ext>
-            </a:extLst>
-          </p:cNvPr>
-          <p:cNvSpPr>
-            <a:spLocks noGrp="1"/>
-          </p:cNvSpPr>
-          <p:nvPr>
-            <p:ph type="ctrTitle"/>
-          </p:nvPr>
-        </p:nvSpPr>
-        <p:spPr/>
-        <p:txBody>
-          <a:bodyPr/>
-          <a:lstStyle/>
-          <a:p>
-            <a:r>
-              <a:rPr lang="en-US" dirty="0"/>
-              <a:t>What would you like to drink today?</a:t>
-            </a:r>
-            <a:endParaRPr lang="en-AU" dirty="0"/>
-          </a:p>
-        </p:txBody>
-      </p:sp>
-      <p:sp>
-        <p:nvSpPr>
           <p:cNvPr id="3" name="Subtitle 2">
             <a:extLst>
               <a:ext uri="{FF2B5EF4-FFF2-40B4-BE49-F238E27FC236}">
@@ -12785,19 +14755,39 @@
         </p:nvSpPr>
         <p:spPr>
           <a:xfrm>
-            <a:off x="1524000" y="1079501"/>
-            <a:ext cx="9144000" cy="1655762"/>
+            <a:off x="1239189" y="713078"/>
+            <a:ext cx="3959888" cy="447848"/>
           </a:xfrm>
         </p:spPr>
         <p:txBody>
-          <a:bodyPr/>
+          <a:bodyPr>
+            <a:normAutofit lnSpcReduction="10000"/>
+          </a:bodyPr>
           <a:lstStyle/>
           <a:p>
             <a:r>
-              <a:rPr lang="en-US" dirty="0"/>
+              <a:rPr lang="en-US" sz="2400" dirty="0">
+                <a:solidFill>
+                  <a:schemeClr val="bg2">
+                    <a:lumMod val="90000"/>
+                    <a:lumOff val="10000"/>
+                  </a:schemeClr>
+                </a:solidFill>
+                <a:latin typeface="Teko Medium" panose="02000000000000000000" pitchFamily="2" charset="0"/>
+                <a:cs typeface="Teko Medium" panose="02000000000000000000" pitchFamily="2" charset="0"/>
+              </a:rPr>
               <a:t>Predictive Pandas presents</a:t>
             </a:r>
-            <a:endParaRPr lang="en-AU" dirty="0"/>
+            <a:endParaRPr lang="en-AU" sz="2400" dirty="0">
+              <a:solidFill>
+                <a:schemeClr val="bg2">
+                  <a:lumMod val="90000"/>
+                  <a:lumOff val="10000"/>
+                </a:schemeClr>
+              </a:solidFill>
+              <a:latin typeface="Teko Medium" panose="02000000000000000000" pitchFamily="2" charset="0"/>
+              <a:cs typeface="Teko Medium" panose="02000000000000000000" pitchFamily="2" charset="0"/>
+            </a:endParaRPr>
           </a:p>
         </p:txBody>
       </p:sp>
@@ -12817,8 +14807,8 @@
         </p:nvSpPr>
         <p:spPr>
           <a:xfrm>
-            <a:off x="266700" y="5022851"/>
-            <a:ext cx="1952625" cy="1655762"/>
+            <a:off x="688730" y="5367268"/>
+            <a:ext cx="1952625" cy="945870"/>
           </a:xfrm>
           <a:prstGeom prst="rect">
             <a:avLst/>
@@ -12826,7 +14816,7 @@
         </p:spPr>
         <p:txBody>
           <a:bodyPr vert="horz" lIns="91440" tIns="45720" rIns="91440" bIns="45720" rtlCol="0">
-            <a:normAutofit fontScale="55000" lnSpcReduction="20000"/>
+            <a:noAutofit/>
           </a:bodyPr>
           <a:lstStyle>
             <a:lvl1pPr marL="0" indent="0" algn="ctr" defTabSz="914400" rtl="0" eaLnBrk="1" latinLnBrk="0" hangingPunct="1">
@@ -12994,52 +14984,361 @@
           </a:lstStyle>
           <a:p>
             <a:r>
-              <a:rPr lang="en-US" dirty="0"/>
+              <a:rPr lang="en-US" dirty="0">
+                <a:solidFill>
+                  <a:schemeClr val="tx1">
+                    <a:lumMod val="75000"/>
+                  </a:schemeClr>
+                </a:solidFill>
+                <a:latin typeface="Teko Light" panose="02000000000000000000" pitchFamily="2" charset="0"/>
+                <a:cs typeface="Teko Light" panose="02000000000000000000" pitchFamily="2" charset="0"/>
+              </a:rPr>
               <a:t>Michelle Hocking</a:t>
             </a:r>
           </a:p>
           <a:p>
             <a:r>
-              <a:rPr lang="en-US" dirty="0"/>
+              <a:rPr lang="en-US" dirty="0">
+                <a:solidFill>
+                  <a:schemeClr val="tx1">
+                    <a:lumMod val="75000"/>
+                  </a:schemeClr>
+                </a:solidFill>
+                <a:latin typeface="Teko Light" panose="02000000000000000000" pitchFamily="2" charset="0"/>
+                <a:cs typeface="Teko Light" panose="02000000000000000000" pitchFamily="2" charset="0"/>
+              </a:rPr>
               <a:t>Eamonn McCallum</a:t>
             </a:r>
           </a:p>
           <a:p>
             <a:r>
-              <a:rPr lang="en-US" dirty="0"/>
+              <a:rPr lang="en-US" dirty="0">
+                <a:solidFill>
+                  <a:schemeClr val="tx1">
+                    <a:lumMod val="75000"/>
+                  </a:schemeClr>
+                </a:solidFill>
+                <a:latin typeface="Teko Light" panose="02000000000000000000" pitchFamily="2" charset="0"/>
+                <a:cs typeface="Teko Light" panose="02000000000000000000" pitchFamily="2" charset="0"/>
+              </a:rPr>
               <a:t>Pooja Mallard</a:t>
             </a:r>
-          </a:p>
-          <a:p>
-            <a:r>
-              <a:rPr lang="en-US" dirty="0" err="1"/>
-              <a:t>Ruohong</a:t>
-            </a:r>
-            <a:r>
-              <a:rPr lang="en-US" dirty="0"/>
-              <a:t> Yuan</a:t>
-            </a:r>
-          </a:p>
-          <a:p>
-            <a:r>
-              <a:rPr lang="en-US" dirty="0"/>
-              <a:t>Yann </a:t>
-            </a:r>
-            <a:r>
-              <a:rPr lang="en-US" dirty="0" err="1"/>
-              <a:t>Chye</a:t>
-            </a:r>
-            <a:endParaRPr lang="en-US" dirty="0"/>
-          </a:p>
-          <a:p>
-            <a:r>
-              <a:rPr lang="en-US" dirty="0"/>
-              <a:t>Katherine Shamai</a:t>
-            </a:r>
-            <a:endParaRPr lang="en-AU" dirty="0"/>
           </a:p>
         </p:txBody>
       </p:sp>
+      <p:sp>
+        <p:nvSpPr>
+          <p:cNvPr id="6" name="Subtitle 2">
+            <a:extLst>
+              <a:ext uri="{FF2B5EF4-FFF2-40B4-BE49-F238E27FC236}">
+                <a16:creationId xmlns:a16="http://schemas.microsoft.com/office/drawing/2014/main" id="{3FE66EA3-78A2-484E-85F0-15436EFCB3DD}"/>
+              </a:ext>
+            </a:extLst>
+          </p:cNvPr>
+          <p:cNvSpPr txBox="1">
+            <a:spLocks/>
+          </p:cNvSpPr>
+          <p:nvPr/>
+        </p:nvSpPr>
+        <p:spPr>
+          <a:xfrm>
+            <a:off x="2641355" y="5367268"/>
+            <a:ext cx="1952625" cy="945870"/>
+          </a:xfrm>
+          <a:prstGeom prst="rect">
+            <a:avLst/>
+          </a:prstGeom>
+        </p:spPr>
+        <p:txBody>
+          <a:bodyPr vert="horz" lIns="91440" tIns="45720" rIns="91440" bIns="45720" rtlCol="0">
+            <a:noAutofit/>
+          </a:bodyPr>
+          <a:lstStyle>
+            <a:lvl1pPr marL="0" indent="0" algn="ctr" defTabSz="914400" rtl="0" eaLnBrk="1" latinLnBrk="0" hangingPunct="1">
+              <a:lnSpc>
+                <a:spcPct val="90000"/>
+              </a:lnSpc>
+              <a:spcBef>
+                <a:spcPts val="1000"/>
+              </a:spcBef>
+              <a:buFont typeface="Arial" panose="020B0604020202020204" pitchFamily="34" charset="0"/>
+              <a:buNone/>
+              <a:defRPr sz="2400" kern="1200">
+                <a:solidFill>
+                  <a:schemeClr val="tx1"/>
+                </a:solidFill>
+                <a:latin typeface="+mn-lt"/>
+                <a:ea typeface="+mn-ea"/>
+                <a:cs typeface="+mn-cs"/>
+              </a:defRPr>
+            </a:lvl1pPr>
+            <a:lvl2pPr marL="457200" indent="0" algn="ctr" defTabSz="914400" rtl="0" eaLnBrk="1" latinLnBrk="0" hangingPunct="1">
+              <a:lnSpc>
+                <a:spcPct val="90000"/>
+              </a:lnSpc>
+              <a:spcBef>
+                <a:spcPts val="500"/>
+              </a:spcBef>
+              <a:buFont typeface="Arial" panose="020B0604020202020204" pitchFamily="34" charset="0"/>
+              <a:buNone/>
+              <a:defRPr sz="2000" kern="1200">
+                <a:solidFill>
+                  <a:schemeClr val="tx1"/>
+                </a:solidFill>
+                <a:latin typeface="+mn-lt"/>
+                <a:ea typeface="+mn-ea"/>
+                <a:cs typeface="+mn-cs"/>
+              </a:defRPr>
+            </a:lvl2pPr>
+            <a:lvl3pPr marL="914400" indent="0" algn="ctr" defTabSz="914400" rtl="0" eaLnBrk="1" latinLnBrk="0" hangingPunct="1">
+              <a:lnSpc>
+                <a:spcPct val="90000"/>
+              </a:lnSpc>
+              <a:spcBef>
+                <a:spcPts val="500"/>
+              </a:spcBef>
+              <a:buFont typeface="Arial" panose="020B0604020202020204" pitchFamily="34" charset="0"/>
+              <a:buNone/>
+              <a:defRPr sz="1800" kern="1200">
+                <a:solidFill>
+                  <a:schemeClr val="tx1"/>
+                </a:solidFill>
+                <a:latin typeface="+mn-lt"/>
+                <a:ea typeface="+mn-ea"/>
+                <a:cs typeface="+mn-cs"/>
+              </a:defRPr>
+            </a:lvl3pPr>
+            <a:lvl4pPr marL="1371600" indent="0" algn="ctr" defTabSz="914400" rtl="0" eaLnBrk="1" latinLnBrk="0" hangingPunct="1">
+              <a:lnSpc>
+                <a:spcPct val="90000"/>
+              </a:lnSpc>
+              <a:spcBef>
+                <a:spcPts val="500"/>
+              </a:spcBef>
+              <a:buFont typeface="Arial" panose="020B0604020202020204" pitchFamily="34" charset="0"/>
+              <a:buNone/>
+              <a:defRPr sz="1600" kern="1200">
+                <a:solidFill>
+                  <a:schemeClr val="tx1"/>
+                </a:solidFill>
+                <a:latin typeface="+mn-lt"/>
+                <a:ea typeface="+mn-ea"/>
+                <a:cs typeface="+mn-cs"/>
+              </a:defRPr>
+            </a:lvl4pPr>
+            <a:lvl5pPr marL="1828800" indent="0" algn="ctr" defTabSz="914400" rtl="0" eaLnBrk="1" latinLnBrk="0" hangingPunct="1">
+              <a:lnSpc>
+                <a:spcPct val="90000"/>
+              </a:lnSpc>
+              <a:spcBef>
+                <a:spcPts val="500"/>
+              </a:spcBef>
+              <a:buFont typeface="Arial" panose="020B0604020202020204" pitchFamily="34" charset="0"/>
+              <a:buNone/>
+              <a:defRPr sz="1600" kern="1200">
+                <a:solidFill>
+                  <a:schemeClr val="tx1"/>
+                </a:solidFill>
+                <a:latin typeface="+mn-lt"/>
+                <a:ea typeface="+mn-ea"/>
+                <a:cs typeface="+mn-cs"/>
+              </a:defRPr>
+            </a:lvl5pPr>
+            <a:lvl6pPr marL="2286000" indent="0" algn="ctr" defTabSz="914400" rtl="0" eaLnBrk="1" latinLnBrk="0" hangingPunct="1">
+              <a:lnSpc>
+                <a:spcPct val="90000"/>
+              </a:lnSpc>
+              <a:spcBef>
+                <a:spcPts val="500"/>
+              </a:spcBef>
+              <a:buFont typeface="Arial" panose="020B0604020202020204" pitchFamily="34" charset="0"/>
+              <a:buNone/>
+              <a:defRPr sz="1600" kern="1200">
+                <a:solidFill>
+                  <a:schemeClr val="tx1"/>
+                </a:solidFill>
+                <a:latin typeface="+mn-lt"/>
+                <a:ea typeface="+mn-ea"/>
+                <a:cs typeface="+mn-cs"/>
+              </a:defRPr>
+            </a:lvl6pPr>
+            <a:lvl7pPr marL="2743200" indent="0" algn="ctr" defTabSz="914400" rtl="0" eaLnBrk="1" latinLnBrk="0" hangingPunct="1">
+              <a:lnSpc>
+                <a:spcPct val="90000"/>
+              </a:lnSpc>
+              <a:spcBef>
+                <a:spcPts val="500"/>
+              </a:spcBef>
+              <a:buFont typeface="Arial" panose="020B0604020202020204" pitchFamily="34" charset="0"/>
+              <a:buNone/>
+              <a:defRPr sz="1600" kern="1200">
+                <a:solidFill>
+                  <a:schemeClr val="tx1"/>
+                </a:solidFill>
+                <a:latin typeface="+mn-lt"/>
+                <a:ea typeface="+mn-ea"/>
+                <a:cs typeface="+mn-cs"/>
+              </a:defRPr>
+            </a:lvl7pPr>
+            <a:lvl8pPr marL="3200400" indent="0" algn="ctr" defTabSz="914400" rtl="0" eaLnBrk="1" latinLnBrk="0" hangingPunct="1">
+              <a:lnSpc>
+                <a:spcPct val="90000"/>
+              </a:lnSpc>
+              <a:spcBef>
+                <a:spcPts val="500"/>
+              </a:spcBef>
+              <a:buFont typeface="Arial" panose="020B0604020202020204" pitchFamily="34" charset="0"/>
+              <a:buNone/>
+              <a:defRPr sz="1600" kern="1200">
+                <a:solidFill>
+                  <a:schemeClr val="tx1"/>
+                </a:solidFill>
+                <a:latin typeface="+mn-lt"/>
+                <a:ea typeface="+mn-ea"/>
+                <a:cs typeface="+mn-cs"/>
+              </a:defRPr>
+            </a:lvl8pPr>
+            <a:lvl9pPr marL="3657600" indent="0" algn="ctr" defTabSz="914400" rtl="0" eaLnBrk="1" latinLnBrk="0" hangingPunct="1">
+              <a:lnSpc>
+                <a:spcPct val="90000"/>
+              </a:lnSpc>
+              <a:spcBef>
+                <a:spcPts val="500"/>
+              </a:spcBef>
+              <a:buFont typeface="Arial" panose="020B0604020202020204" pitchFamily="34" charset="0"/>
+              <a:buNone/>
+              <a:defRPr sz="1600" kern="1200">
+                <a:solidFill>
+                  <a:schemeClr val="tx1"/>
+                </a:solidFill>
+                <a:latin typeface="+mn-lt"/>
+                <a:ea typeface="+mn-ea"/>
+                <a:cs typeface="+mn-cs"/>
+              </a:defRPr>
+            </a:lvl9pPr>
+          </a:lstStyle>
+          <a:p>
+            <a:r>
+              <a:rPr lang="en-US" dirty="0" err="1">
+                <a:solidFill>
+                  <a:schemeClr val="tx1">
+                    <a:lumMod val="75000"/>
+                  </a:schemeClr>
+                </a:solidFill>
+                <a:latin typeface="Teko Light" panose="02000000000000000000" pitchFamily="2" charset="0"/>
+                <a:cs typeface="Teko Light" panose="02000000000000000000" pitchFamily="2" charset="0"/>
+              </a:rPr>
+              <a:t>Ruohong</a:t>
+            </a:r>
+            <a:r>
+              <a:rPr lang="en-US" dirty="0">
+                <a:solidFill>
+                  <a:schemeClr val="tx1">
+                    <a:lumMod val="75000"/>
+                  </a:schemeClr>
+                </a:solidFill>
+                <a:latin typeface="Teko Light" panose="02000000000000000000" pitchFamily="2" charset="0"/>
+                <a:cs typeface="Teko Light" panose="02000000000000000000" pitchFamily="2" charset="0"/>
+              </a:rPr>
+              <a:t> Yuan</a:t>
+            </a:r>
+          </a:p>
+          <a:p>
+            <a:r>
+              <a:rPr lang="en-US" dirty="0">
+                <a:solidFill>
+                  <a:schemeClr val="tx1">
+                    <a:lumMod val="75000"/>
+                  </a:schemeClr>
+                </a:solidFill>
+                <a:latin typeface="Teko Light" panose="02000000000000000000" pitchFamily="2" charset="0"/>
+                <a:cs typeface="Teko Light" panose="02000000000000000000" pitchFamily="2" charset="0"/>
+              </a:rPr>
+              <a:t>Yann </a:t>
+            </a:r>
+            <a:r>
+              <a:rPr lang="en-US" dirty="0" err="1">
+                <a:solidFill>
+                  <a:schemeClr val="tx1">
+                    <a:lumMod val="75000"/>
+                  </a:schemeClr>
+                </a:solidFill>
+                <a:latin typeface="Teko Light" panose="02000000000000000000" pitchFamily="2" charset="0"/>
+                <a:cs typeface="Teko Light" panose="02000000000000000000" pitchFamily="2" charset="0"/>
+              </a:rPr>
+              <a:t>Chye</a:t>
+            </a:r>
+            <a:endParaRPr lang="en-US" dirty="0">
+              <a:solidFill>
+                <a:schemeClr val="tx1">
+                  <a:lumMod val="75000"/>
+                </a:schemeClr>
+              </a:solidFill>
+              <a:latin typeface="Teko Light" panose="02000000000000000000" pitchFamily="2" charset="0"/>
+              <a:cs typeface="Teko Light" panose="02000000000000000000" pitchFamily="2" charset="0"/>
+            </a:endParaRPr>
+          </a:p>
+          <a:p>
+            <a:r>
+              <a:rPr lang="en-US" dirty="0">
+                <a:solidFill>
+                  <a:schemeClr val="tx1">
+                    <a:lumMod val="75000"/>
+                  </a:schemeClr>
+                </a:solidFill>
+                <a:latin typeface="Teko Light" panose="02000000000000000000" pitchFamily="2" charset="0"/>
+                <a:cs typeface="Teko Light" panose="02000000000000000000" pitchFamily="2" charset="0"/>
+              </a:rPr>
+              <a:t>Katherine Shamai</a:t>
+            </a:r>
+            <a:endParaRPr lang="en-AU" dirty="0">
+              <a:solidFill>
+                <a:schemeClr val="tx1">
+                  <a:lumMod val="75000"/>
+                </a:schemeClr>
+              </a:solidFill>
+              <a:latin typeface="Teko Light" panose="02000000000000000000" pitchFamily="2" charset="0"/>
+              <a:cs typeface="Teko Light" panose="02000000000000000000" pitchFamily="2" charset="0"/>
+            </a:endParaRPr>
+          </a:p>
+        </p:txBody>
+      </p:sp>
+      <p:pic>
+        <p:nvPicPr>
+          <p:cNvPr id="10" name="Picture 9">
+            <a:extLst>
+              <a:ext uri="{FF2B5EF4-FFF2-40B4-BE49-F238E27FC236}">
+                <a16:creationId xmlns:a16="http://schemas.microsoft.com/office/drawing/2014/main" id="{467DDCFB-8F1B-4AB9-ABCC-5DFFE5F9838D}"/>
+              </a:ext>
+            </a:extLst>
+          </p:cNvPr>
+          <p:cNvPicPr>
+            <a:picLocks noChangeAspect="1"/>
+          </p:cNvPicPr>
+          <p:nvPr/>
+        </p:nvPicPr>
+        <p:blipFill>
+          <a:blip r:embed="rId3">
+            <a:extLst>
+              <a:ext uri="{28A0092B-C50C-407E-A947-70E740481C1C}">
+                <a14:useLocalDpi xmlns:a14="http://schemas.microsoft.com/office/drawing/2010/main" val="0"/>
+              </a:ext>
+            </a:extLst>
+          </a:blip>
+          <a:stretch>
+            <a:fillRect/>
+          </a:stretch>
+        </p:blipFill>
+        <p:spPr>
+          <a:xfrm>
+            <a:off x="1135064" y="1017797"/>
+            <a:ext cx="4168138" cy="4168138"/>
+          </a:xfrm>
+          <a:prstGeom prst="rect">
+            <a:avLst/>
+          </a:prstGeom>
+        </p:spPr>
+      </p:pic>
     </p:spTree>
     <p:extLst>
       <p:ext uri="{BB962C8B-B14F-4D97-AF65-F5344CB8AC3E}">
@@ -13456,7 +15755,19 @@
           <a:bodyPr/>
           <a:lstStyle/>
           <a:p>
-            <a:endParaRPr lang="en-AU"/>
+            <a:r>
+              <a:rPr lang="en-US" dirty="0"/>
+              <a:t>Seek feedback from users on our recommendation to enable further refinement of the machine learning model</a:t>
+            </a:r>
+          </a:p>
+          <a:p>
+            <a:r>
+              <a:rPr lang="en-US" dirty="0"/>
+              <a:t>Provide reviewing capabilities to grow the dataset for machine learning</a:t>
+            </a:r>
+          </a:p>
+          <a:p>
+            <a:endParaRPr lang="en-AU" dirty="0"/>
           </a:p>
         </p:txBody>
       </p:sp>
@@ -13563,7 +15874,7 @@
     <p:bg>
       <p:bgPr>
         <a:blipFill rotWithShape="1">
-          <a:blip r:embed="rId2">
+          <a:blip r:embed="rId3">
             <a:duotone>
               <a:schemeClr val="bg2">
                 <a:shade val="80000"/>
@@ -13653,7 +15964,7 @@
           </p:nvPr>
         </p:nvPicPr>
         <p:blipFill rotWithShape="1">
-          <a:blip r:embed="rId3">
+          <a:blip r:embed="rId4">
             <a:extLst>
               <a:ext uri="{28A0092B-C50C-407E-A947-70E740481C1C}">
                 <a14:useLocalDpi xmlns:a14="http://schemas.microsoft.com/office/drawing/2010/main" val="0"/>
@@ -13689,21 +16000,110 @@
             <p:ph idx="1"/>
             <p:extLst>
               <p:ext uri="{D42A27DB-BD31-4B8C-83A1-F6EECF244321}">
-                <p14:modId xmlns:p14="http://schemas.microsoft.com/office/powerpoint/2010/main" val="972063960"/>
+                <p14:modId xmlns:p14="http://schemas.microsoft.com/office/powerpoint/2010/main" val="3685107810"/>
               </p:ext>
             </p:extLst>
           </p:nvPr>
         </p:nvGraphicFramePr>
         <p:xfrm>
           <a:off x="5282521" y="709683"/>
-          <a:ext cx="6266011" cy="4899547"/>
+          <a:ext cx="6266011" cy="5600682"/>
         </p:xfrm>
         <a:graphic>
           <a:graphicData uri="http://schemas.openxmlformats.org/drawingml/2006/diagram">
-            <dgm:relIds xmlns:dgm="http://schemas.openxmlformats.org/drawingml/2006/diagram" xmlns:r="http://schemas.openxmlformats.org/officeDocument/2006/relationships" r:dm="rId4" r:lo="rId5" r:qs="rId6" r:cs="rId7"/>
+            <dgm:relIds xmlns:dgm="http://schemas.openxmlformats.org/drawingml/2006/diagram" xmlns:r="http://schemas.openxmlformats.org/officeDocument/2006/relationships" r:dm="rId5" r:lo="rId6" r:qs="rId7" r:cs="rId8"/>
           </a:graphicData>
         </a:graphic>
       </p:graphicFrame>
+      <p:pic>
+        <p:nvPicPr>
+          <p:cNvPr id="4" name="Picture 3" descr="Alcohol Beer Stein - Free vector graphic on Pixabay">
+            <a:extLst>
+              <a:ext uri="{FF2B5EF4-FFF2-40B4-BE49-F238E27FC236}">
+                <a16:creationId xmlns:a16="http://schemas.microsoft.com/office/drawing/2014/main" id="{58554E4C-9C9F-4D63-9022-5133D50835B8}"/>
+              </a:ext>
+            </a:extLst>
+          </p:cNvPr>
+          <p:cNvPicPr>
+            <a:picLocks noChangeAspect="1" noChangeArrowheads="1"/>
+          </p:cNvPicPr>
+          <p:nvPr/>
+        </p:nvPicPr>
+        <p:blipFill>
+          <a:blip r:embed="rId10">
+            <a:extLst>
+              <a:ext uri="{28A0092B-C50C-407E-A947-70E740481C1C}">
+                <a14:useLocalDpi xmlns:a14="http://schemas.microsoft.com/office/drawing/2010/main" val="0"/>
+              </a:ext>
+            </a:extLst>
+          </a:blip>
+          <a:srcRect/>
+          <a:stretch>
+            <a:fillRect/>
+          </a:stretch>
+        </p:blipFill>
+        <p:spPr bwMode="auto">
+          <a:xfrm>
+            <a:off x="179916" y="4825219"/>
+            <a:ext cx="1372277" cy="1929764"/>
+          </a:xfrm>
+          <a:prstGeom prst="rect">
+            <a:avLst/>
+          </a:prstGeom>
+          <a:noFill/>
+          <a:extLst>
+            <a:ext uri="{909E8E84-426E-40DD-AFC4-6F175D3DCCD1}">
+              <a14:hiddenFill xmlns:a14="http://schemas.microsoft.com/office/drawing/2010/main">
+                <a:solidFill>
+                  <a:srgbClr val="FFFFFF"/>
+                </a:solidFill>
+              </a14:hiddenFill>
+            </a:ext>
+          </a:extLst>
+        </p:spPr>
+      </p:pic>
+      <p:sp>
+        <p:nvSpPr>
+          <p:cNvPr id="6" name="TextBox 5">
+            <a:extLst>
+              <a:ext uri="{FF2B5EF4-FFF2-40B4-BE49-F238E27FC236}">
+                <a16:creationId xmlns:a16="http://schemas.microsoft.com/office/drawing/2014/main" id="{A848F25A-C42F-443B-B984-F1B714A9D64C}"/>
+              </a:ext>
+            </a:extLst>
+          </p:cNvPr>
+          <p:cNvSpPr txBox="1"/>
+          <p:nvPr/>
+        </p:nvSpPr>
+        <p:spPr>
+          <a:xfrm>
+            <a:off x="480733" y="5661482"/>
+            <a:ext cx="901874" cy="738664"/>
+          </a:xfrm>
+          <a:prstGeom prst="rect">
+            <a:avLst/>
+          </a:prstGeom>
+          <a:noFill/>
+        </p:spPr>
+        <p:txBody>
+          <a:bodyPr wrap="square" rtlCol="0">
+            <a:spAutoFit/>
+          </a:bodyPr>
+          <a:lstStyle/>
+          <a:p>
+            <a:pPr algn="ctr"/>
+            <a:r>
+              <a:rPr lang="en-US" sz="1050" b="1" i="0" dirty="0">
+                <a:solidFill>
+                  <a:srgbClr val="1B1B1B"/>
+                </a:solidFill>
+                <a:effectLst/>
+                <a:latin typeface="Heebo"/>
+              </a:rPr>
+              <a:t>The oldest brewery dates back to 1040</a:t>
+            </a:r>
+          </a:p>
+        </p:txBody>
+      </p:sp>
     </p:spTree>
     <p:extLst>
       <p:ext uri="{BB962C8B-B14F-4D97-AF65-F5344CB8AC3E}">
@@ -13723,7 +16123,7 @@
     <p:bg>
       <p:bgPr>
         <a:blipFill rotWithShape="1">
-          <a:blip r:embed="rId2">
+          <a:blip r:embed="rId3">
             <a:duotone>
               <a:schemeClr val="bg2">
                 <a:shade val="80000"/>
@@ -13783,7 +16183,7 @@
           <a:p>
             <a:r>
               <a:rPr lang="en-US" dirty="0"/>
-              <a:t>Data search</a:t>
+              <a:t>Data points</a:t>
             </a:r>
             <a:endParaRPr lang="en-AU" dirty="0"/>
           </a:p>
@@ -13813,7 +16213,7 @@
           </p:nvPr>
         </p:nvPicPr>
         <p:blipFill rotWithShape="1">
-          <a:blip r:embed="rId3">
+          <a:blip r:embed="rId4">
             <a:extLst>
               <a:ext uri="{28A0092B-C50C-407E-A947-70E740481C1C}">
                 <a14:useLocalDpi xmlns:a14="http://schemas.microsoft.com/office/drawing/2010/main" val="0"/>
@@ -13856,7 +16256,7 @@
             <p:ph idx="1"/>
             <p:extLst>
               <p:ext uri="{D42A27DB-BD31-4B8C-83A1-F6EECF244321}">
-                <p14:modId xmlns:p14="http://schemas.microsoft.com/office/powerpoint/2010/main" val="4132587087"/>
+                <p14:modId xmlns:p14="http://schemas.microsoft.com/office/powerpoint/2010/main" val="3601160260"/>
               </p:ext>
             </p:extLst>
           </p:nvPr>
@@ -13867,10 +16267,99 @@
         </p:xfrm>
         <a:graphic>
           <a:graphicData uri="http://schemas.openxmlformats.org/drawingml/2006/diagram">
-            <dgm:relIds xmlns:dgm="http://schemas.openxmlformats.org/drawingml/2006/diagram" xmlns:r="http://schemas.openxmlformats.org/officeDocument/2006/relationships" r:dm="rId4" r:lo="rId5" r:qs="rId6" r:cs="rId7"/>
+            <dgm:relIds xmlns:dgm="http://schemas.openxmlformats.org/drawingml/2006/diagram" xmlns:r="http://schemas.openxmlformats.org/officeDocument/2006/relationships" r:dm="rId5" r:lo="rId6" r:qs="rId7" r:cs="rId8"/>
           </a:graphicData>
         </a:graphic>
       </p:graphicFrame>
+      <p:pic>
+        <p:nvPicPr>
+          <p:cNvPr id="3" name="Picture 2" descr="Alcohol Beer Stein - Free vector graphic on Pixabay">
+            <a:extLst>
+              <a:ext uri="{FF2B5EF4-FFF2-40B4-BE49-F238E27FC236}">
+                <a16:creationId xmlns:a16="http://schemas.microsoft.com/office/drawing/2014/main" id="{726EC9C9-3BD3-4C13-BA3E-953FE7D1766E}"/>
+              </a:ext>
+            </a:extLst>
+          </p:cNvPr>
+          <p:cNvPicPr>
+            <a:picLocks noChangeAspect="1" noChangeArrowheads="1"/>
+          </p:cNvPicPr>
+          <p:nvPr/>
+        </p:nvPicPr>
+        <p:blipFill>
+          <a:blip r:embed="rId10">
+            <a:extLst>
+              <a:ext uri="{28A0092B-C50C-407E-A947-70E740481C1C}">
+                <a14:useLocalDpi xmlns:a14="http://schemas.microsoft.com/office/drawing/2010/main" val="0"/>
+              </a:ext>
+            </a:extLst>
+          </a:blip>
+          <a:srcRect/>
+          <a:stretch>
+            <a:fillRect/>
+          </a:stretch>
+        </p:blipFill>
+        <p:spPr bwMode="auto">
+          <a:xfrm flipH="1">
+            <a:off x="10697719" y="4762919"/>
+            <a:ext cx="1372277" cy="1929764"/>
+          </a:xfrm>
+          <a:prstGeom prst="rect">
+            <a:avLst/>
+          </a:prstGeom>
+          <a:noFill/>
+          <a:extLst>
+            <a:ext uri="{909E8E84-426E-40DD-AFC4-6F175D3DCCD1}">
+              <a14:hiddenFill xmlns:a14="http://schemas.microsoft.com/office/drawing/2010/main">
+                <a:solidFill>
+                  <a:srgbClr val="FFFFFF"/>
+                </a:solidFill>
+              </a14:hiddenFill>
+            </a:ext>
+          </a:extLst>
+        </p:spPr>
+      </p:pic>
+      <p:sp>
+        <p:nvSpPr>
+          <p:cNvPr id="4" name="TextBox 3">
+            <a:extLst>
+              <a:ext uri="{FF2B5EF4-FFF2-40B4-BE49-F238E27FC236}">
+                <a16:creationId xmlns:a16="http://schemas.microsoft.com/office/drawing/2014/main" id="{C3369C1F-E41D-433D-99AE-CA8CBB221662}"/>
+              </a:ext>
+            </a:extLst>
+          </p:cNvPr>
+          <p:cNvSpPr txBox="1"/>
+          <p:nvPr/>
+        </p:nvSpPr>
+        <p:spPr>
+          <a:xfrm>
+            <a:off x="10900191" y="5181360"/>
+            <a:ext cx="901874" cy="1384995"/>
+          </a:xfrm>
+          <a:prstGeom prst="rect">
+            <a:avLst/>
+          </a:prstGeom>
+          <a:noFill/>
+        </p:spPr>
+        <p:txBody>
+          <a:bodyPr wrap="square" rtlCol="0">
+            <a:spAutoFit/>
+          </a:bodyPr>
+          <a:lstStyle/>
+          <a:p>
+            <a:pPr algn="ctr"/>
+            <a:r>
+              <a:rPr lang="en-US" sz="1050" b="1" i="0" dirty="0">
+                <a:solidFill>
+                  <a:srgbClr val="1B1B1B"/>
+                </a:solidFill>
+                <a:effectLst/>
+                <a:latin typeface="Heebo"/>
+              </a:rPr>
+              <a:t>China is the world’s biggest beer producer with over 47 million kiloliters per year</a:t>
+            </a:r>
+          </a:p>
+        </p:txBody>
+      </p:sp>
     </p:spTree>
     <p:extLst>
       <p:ext uri="{BB962C8B-B14F-4D97-AF65-F5344CB8AC3E}">
@@ -14171,27 +16660,100 @@
           <a:lstStyle/>
           <a:p>
             <a:r>
-              <a:rPr lang="en-US">
+              <a:rPr lang="en-US" dirty="0">
                 <a:solidFill>
                   <a:schemeClr val="tx1"/>
                 </a:solidFill>
               </a:rPr>
-              <a:t>ETL</a:t>
-            </a:r>
-          </a:p>
-          <a:p>
-            <a:r>
-              <a:rPr lang="en-US">
+              <a:t>Data extraction</a:t>
+            </a:r>
+          </a:p>
+          <a:p>
+            <a:r>
+              <a:rPr lang="en-US" dirty="0">
                 <a:solidFill>
                   <a:schemeClr val="tx1"/>
                 </a:solidFill>
               </a:rPr>
-              <a:t>ML</a:t>
-            </a:r>
-          </a:p>
-          <a:p>
-            <a:r>
-              <a:rPr lang="en-US">
+              <a:t>Data transformation</a:t>
+            </a:r>
+          </a:p>
+          <a:p>
+            <a:pPr lvl="1"/>
+            <a:r>
+              <a:rPr lang="en-US" dirty="0">
+                <a:solidFill>
+                  <a:schemeClr val="tx1"/>
+                </a:solidFill>
+              </a:rPr>
+              <a:t>Exploratory </a:t>
+            </a:r>
+            <a:r>
+              <a:rPr lang="en-US" dirty="0" err="1">
+                <a:solidFill>
+                  <a:schemeClr val="tx1"/>
+                </a:solidFill>
+              </a:rPr>
+              <a:t>anslysis</a:t>
+            </a:r>
+            <a:endParaRPr lang="en-US" dirty="0">
+              <a:solidFill>
+                <a:schemeClr val="tx1"/>
+              </a:solidFill>
+            </a:endParaRPr>
+          </a:p>
+          <a:p>
+            <a:pPr lvl="1"/>
+            <a:r>
+              <a:rPr lang="en-US" dirty="0" err="1">
+                <a:solidFill>
+                  <a:schemeClr val="tx1"/>
+                </a:solidFill>
+              </a:rPr>
+              <a:t>Visualising</a:t>
+            </a:r>
+            <a:r>
+              <a:rPr lang="en-US" dirty="0">
+                <a:solidFill>
+                  <a:schemeClr val="tx1"/>
+                </a:solidFill>
+              </a:rPr>
+              <a:t> the data</a:t>
+            </a:r>
+          </a:p>
+          <a:p>
+            <a:r>
+              <a:rPr lang="en-US" dirty="0">
+                <a:solidFill>
+                  <a:schemeClr val="tx1"/>
+                </a:solidFill>
+              </a:rPr>
+              <a:t>Data aggregation</a:t>
+            </a:r>
+          </a:p>
+          <a:p>
+            <a:r>
+              <a:rPr lang="en-US" dirty="0">
+                <a:solidFill>
+                  <a:schemeClr val="tx1"/>
+                </a:solidFill>
+              </a:rPr>
+              <a:t>Adding features</a:t>
+            </a:r>
+          </a:p>
+          <a:p>
+            <a:r>
+              <a:rPr lang="en-US" dirty="0">
+                <a:solidFill>
+                  <a:schemeClr val="tx1"/>
+                </a:solidFill>
+              </a:rPr>
+              <a:t>Machine learning</a:t>
+            </a:r>
+          </a:p>
+          <a:p>
+            <a:r>
+              <a:rPr lang="en-US" dirty="0">
                 <a:solidFill>
                   <a:schemeClr val="tx1"/>
                 </a:solidFill>
@@ -14201,22 +16763,12 @@
           </a:p>
           <a:p>
             <a:r>
-              <a:rPr lang="en-US">
+              <a:rPr lang="en-US" dirty="0">
                 <a:solidFill>
                   <a:schemeClr val="tx1"/>
                 </a:solidFill>
               </a:rPr>
-              <a:t>Visualisation</a:t>
-            </a:r>
-          </a:p>
-          <a:p>
-            <a:r>
-              <a:rPr lang="en-US">
-                <a:solidFill>
-                  <a:schemeClr val="tx1"/>
-                </a:solidFill>
-              </a:rPr>
-              <a:t>Publication</a:t>
+              <a:t>Web app</a:t>
             </a:r>
           </a:p>
         </p:txBody>
@@ -14910,4 +17462,299 @@
     </a:ext>
   </a:extLst>
 </a:theme>
+</file>
+
+<file path=ppt/theme/theme2.xml><?xml version="1.0" encoding="utf-8"?>
+<a:theme xmlns:a="http://schemas.openxmlformats.org/drawingml/2006/main" name="Office Theme">
+  <a:themeElements>
+    <a:clrScheme name="Office">
+      <a:dk1>
+        <a:sysClr val="windowText" lastClr="000000"/>
+      </a:dk1>
+      <a:lt1>
+        <a:sysClr val="window" lastClr="FFFFFF"/>
+      </a:lt1>
+      <a:dk2>
+        <a:srgbClr val="44546A"/>
+      </a:dk2>
+      <a:lt2>
+        <a:srgbClr val="E7E6E6"/>
+      </a:lt2>
+      <a:accent1>
+        <a:srgbClr val="4472C4"/>
+      </a:accent1>
+      <a:accent2>
+        <a:srgbClr val="ED7D31"/>
+      </a:accent2>
+      <a:accent3>
+        <a:srgbClr val="A5A5A5"/>
+      </a:accent3>
+      <a:accent4>
+        <a:srgbClr val="FFC000"/>
+      </a:accent4>
+      <a:accent5>
+        <a:srgbClr val="5B9BD5"/>
+      </a:accent5>
+      <a:accent6>
+        <a:srgbClr val="70AD47"/>
+      </a:accent6>
+      <a:hlink>
+        <a:srgbClr val="0563C1"/>
+      </a:hlink>
+      <a:folHlink>
+        <a:srgbClr val="954F72"/>
+      </a:folHlink>
+    </a:clrScheme>
+    <a:fontScheme name="Office">
+      <a:majorFont>
+        <a:latin typeface="Calibri Light" panose="020F0302020204030204"/>
+        <a:ea typeface=""/>
+        <a:cs typeface=""/>
+        <a:font script="Jpan" typeface="游ゴシック Light"/>
+        <a:font script="Hang" typeface="맑은 고딕"/>
+        <a:font script="Hans" typeface="等线 Light"/>
+        <a:font script="Hant" typeface="新細明體"/>
+        <a:font script="Arab" typeface="Times New Roman"/>
+        <a:font script="Hebr" typeface="Times New Roman"/>
+        <a:font script="Thai" typeface="Angsana New"/>
+        <a:font script="Ethi" typeface="Nyala"/>
+        <a:font script="Beng" typeface="Vrinda"/>
+        <a:font script="Gujr" typeface="Shruti"/>
+        <a:font script="Khmr" typeface="MoolBoran"/>
+        <a:font script="Knda" typeface="Tunga"/>
+        <a:font script="Guru" typeface="Raavi"/>
+        <a:font script="Cans" typeface="Euphemia"/>
+        <a:font script="Cher" typeface="Plantagenet Cherokee"/>
+        <a:font script="Yiii" typeface="Microsoft Yi Baiti"/>
+        <a:font script="Tibt" typeface="Microsoft Himalaya"/>
+        <a:font script="Thaa" typeface="MV Boli"/>
+        <a:font script="Deva" typeface="Mangal"/>
+        <a:font script="Telu" typeface="Gautami"/>
+        <a:font script="Taml" typeface="Latha"/>
+        <a:font script="Syrc" typeface="Estrangelo Edessa"/>
+        <a:font script="Orya" typeface="Kalinga"/>
+        <a:font script="Mlym" typeface="Kartika"/>
+        <a:font script="Laoo" typeface="DokChampa"/>
+        <a:font script="Sinh" typeface="Iskoola Pota"/>
+        <a:font script="Mong" typeface="Mongolian Baiti"/>
+        <a:font script="Viet" typeface="Times New Roman"/>
+        <a:font script="Uigh" typeface="Microsoft Uighur"/>
+        <a:font script="Geor" typeface="Sylfaen"/>
+        <a:font script="Armn" typeface="Arial"/>
+        <a:font script="Bugi" typeface="Leelawadee UI"/>
+        <a:font script="Bopo" typeface="Microsoft JhengHei"/>
+        <a:font script="Java" typeface="Javanese Text"/>
+        <a:font script="Lisu" typeface="Segoe UI"/>
+        <a:font script="Mymr" typeface="Myanmar Text"/>
+        <a:font script="Nkoo" typeface="Ebrima"/>
+        <a:font script="Olck" typeface="Nirmala UI"/>
+        <a:font script="Osma" typeface="Ebrima"/>
+        <a:font script="Phag" typeface="Phagspa"/>
+        <a:font script="Syrn" typeface="Estrangelo Edessa"/>
+        <a:font script="Syrj" typeface="Estrangelo Edessa"/>
+        <a:font script="Syre" typeface="Estrangelo Edessa"/>
+        <a:font script="Sora" typeface="Nirmala UI"/>
+        <a:font script="Tale" typeface="Microsoft Tai Le"/>
+        <a:font script="Talu" typeface="Microsoft New Tai Lue"/>
+        <a:font script="Tfng" typeface="Ebrima"/>
+      </a:majorFont>
+      <a:minorFont>
+        <a:latin typeface="Calibri" panose="020F0502020204030204"/>
+        <a:ea typeface=""/>
+        <a:cs typeface=""/>
+        <a:font script="Jpan" typeface="游ゴシック"/>
+        <a:font script="Hang" typeface="맑은 고딕"/>
+        <a:font script="Hans" typeface="等线"/>
+        <a:font script="Hant" typeface="新細明體"/>
+        <a:font script="Arab" typeface="Arial"/>
+        <a:font script="Hebr" typeface="Arial"/>
+        <a:font script="Thai" typeface="Cordia New"/>
+        <a:font script="Ethi" typeface="Nyala"/>
+        <a:font script="Beng" typeface="Vrinda"/>
+        <a:font script="Gujr" typeface="Shruti"/>
+        <a:font script="Khmr" typeface="DaunPenh"/>
+        <a:font script="Knda" typeface="Tunga"/>
+        <a:font script="Guru" typeface="Raavi"/>
+        <a:font script="Cans" typeface="Euphemia"/>
+        <a:font script="Cher" typeface="Plantagenet Cherokee"/>
+        <a:font script="Yiii" typeface="Microsoft Yi Baiti"/>
+        <a:font script="Tibt" typeface="Microsoft Himalaya"/>
+        <a:font script="Thaa" typeface="MV Boli"/>
+        <a:font script="Deva" typeface="Mangal"/>
+        <a:font script="Telu" typeface="Gautami"/>
+        <a:font script="Taml" typeface="Latha"/>
+        <a:font script="Syrc" typeface="Estrangelo Edessa"/>
+        <a:font script="Orya" typeface="Kalinga"/>
+        <a:font script="Mlym" typeface="Kartika"/>
+        <a:font script="Laoo" typeface="DokChampa"/>
+        <a:font script="Sinh" typeface="Iskoola Pota"/>
+        <a:font script="Mong" typeface="Mongolian Baiti"/>
+        <a:font script="Viet" typeface="Arial"/>
+        <a:font script="Uigh" typeface="Microsoft Uighur"/>
+        <a:font script="Geor" typeface="Sylfaen"/>
+        <a:font script="Armn" typeface="Arial"/>
+        <a:font script="Bugi" typeface="Leelawadee UI"/>
+        <a:font script="Bopo" typeface="Microsoft JhengHei"/>
+        <a:font script="Java" typeface="Javanese Text"/>
+        <a:font script="Lisu" typeface="Segoe UI"/>
+        <a:font script="Mymr" typeface="Myanmar Text"/>
+        <a:font script="Nkoo" typeface="Ebrima"/>
+        <a:font script="Olck" typeface="Nirmala UI"/>
+        <a:font script="Osma" typeface="Ebrima"/>
+        <a:font script="Phag" typeface="Phagspa"/>
+        <a:font script="Syrn" typeface="Estrangelo Edessa"/>
+        <a:font script="Syrj" typeface="Estrangelo Edessa"/>
+        <a:font script="Syre" typeface="Estrangelo Edessa"/>
+        <a:font script="Sora" typeface="Nirmala UI"/>
+        <a:font script="Tale" typeface="Microsoft Tai Le"/>
+        <a:font script="Talu" typeface="Microsoft New Tai Lue"/>
+        <a:font script="Tfng" typeface="Ebrima"/>
+      </a:minorFont>
+    </a:fontScheme>
+    <a:fmtScheme name="Office">
+      <a:fillStyleLst>
+        <a:solidFill>
+          <a:schemeClr val="phClr"/>
+        </a:solidFill>
+        <a:gradFill rotWithShape="1">
+          <a:gsLst>
+            <a:gs pos="0">
+              <a:schemeClr val="phClr">
+                <a:lumMod val="110000"/>
+                <a:satMod val="105000"/>
+                <a:tint val="67000"/>
+              </a:schemeClr>
+            </a:gs>
+            <a:gs pos="50000">
+              <a:schemeClr val="phClr">
+                <a:lumMod val="105000"/>
+                <a:satMod val="103000"/>
+                <a:tint val="73000"/>
+              </a:schemeClr>
+            </a:gs>
+            <a:gs pos="100000">
+              <a:schemeClr val="phClr">
+                <a:lumMod val="105000"/>
+                <a:satMod val="109000"/>
+                <a:tint val="81000"/>
+              </a:schemeClr>
+            </a:gs>
+          </a:gsLst>
+          <a:lin ang="5400000" scaled="0"/>
+        </a:gradFill>
+        <a:gradFill rotWithShape="1">
+          <a:gsLst>
+            <a:gs pos="0">
+              <a:schemeClr val="phClr">
+                <a:satMod val="103000"/>
+                <a:lumMod val="102000"/>
+                <a:tint val="94000"/>
+              </a:schemeClr>
+            </a:gs>
+            <a:gs pos="50000">
+              <a:schemeClr val="phClr">
+                <a:satMod val="110000"/>
+                <a:lumMod val="100000"/>
+                <a:shade val="100000"/>
+              </a:schemeClr>
+            </a:gs>
+            <a:gs pos="100000">
+              <a:schemeClr val="phClr">
+                <a:lumMod val="99000"/>
+                <a:satMod val="120000"/>
+                <a:shade val="78000"/>
+              </a:schemeClr>
+            </a:gs>
+          </a:gsLst>
+          <a:lin ang="5400000" scaled="0"/>
+        </a:gradFill>
+      </a:fillStyleLst>
+      <a:lnStyleLst>
+        <a:ln w="6350" cap="flat" cmpd="sng" algn="ctr">
+          <a:solidFill>
+            <a:schemeClr val="phClr"/>
+          </a:solidFill>
+          <a:prstDash val="solid"/>
+          <a:miter lim="800000"/>
+        </a:ln>
+        <a:ln w="12700" cap="flat" cmpd="sng" algn="ctr">
+          <a:solidFill>
+            <a:schemeClr val="phClr"/>
+          </a:solidFill>
+          <a:prstDash val="solid"/>
+          <a:miter lim="800000"/>
+        </a:ln>
+        <a:ln w="19050" cap="flat" cmpd="sng" algn="ctr">
+          <a:solidFill>
+            <a:schemeClr val="phClr"/>
+          </a:solidFill>
+          <a:prstDash val="solid"/>
+          <a:miter lim="800000"/>
+        </a:ln>
+      </a:lnStyleLst>
+      <a:effectStyleLst>
+        <a:effectStyle>
+          <a:effectLst/>
+        </a:effectStyle>
+        <a:effectStyle>
+          <a:effectLst/>
+        </a:effectStyle>
+        <a:effectStyle>
+          <a:effectLst>
+            <a:outerShdw blurRad="57150" dist="19050" dir="5400000" algn="ctr" rotWithShape="0">
+              <a:srgbClr val="000000">
+                <a:alpha val="63000"/>
+              </a:srgbClr>
+            </a:outerShdw>
+          </a:effectLst>
+        </a:effectStyle>
+      </a:effectStyleLst>
+      <a:bgFillStyleLst>
+        <a:solidFill>
+          <a:schemeClr val="phClr"/>
+        </a:solidFill>
+        <a:solidFill>
+          <a:schemeClr val="phClr">
+            <a:tint val="95000"/>
+            <a:satMod val="170000"/>
+          </a:schemeClr>
+        </a:solidFill>
+        <a:gradFill rotWithShape="1">
+          <a:gsLst>
+            <a:gs pos="0">
+              <a:schemeClr val="phClr">
+                <a:tint val="93000"/>
+                <a:satMod val="150000"/>
+                <a:shade val="98000"/>
+                <a:lumMod val="102000"/>
+              </a:schemeClr>
+            </a:gs>
+            <a:gs pos="50000">
+              <a:schemeClr val="phClr">
+                <a:tint val="98000"/>
+                <a:satMod val="130000"/>
+                <a:shade val="90000"/>
+                <a:lumMod val="103000"/>
+              </a:schemeClr>
+            </a:gs>
+            <a:gs pos="100000">
+              <a:schemeClr val="phClr">
+                <a:shade val="63000"/>
+                <a:satMod val="120000"/>
+              </a:schemeClr>
+            </a:gs>
+          </a:gsLst>
+          <a:lin ang="5400000" scaled="0"/>
+        </a:gradFill>
+      </a:bgFillStyleLst>
+    </a:fmtScheme>
+  </a:themeElements>
+  <a:objectDefaults/>
+  <a:extraClrSchemeLst/>
+  <a:extLst>
+    <a:ext uri="{05A4C25C-085E-4340-85A3-A5531E510DB2}">
+      <thm15:themeFamily xmlns:thm15="http://schemas.microsoft.com/office/thememl/2012/main" name="Office Theme" id="{62F939B6-93AF-4DB8-9C6B-D6C7DFDC589F}" vid="{4A3C46E8-61CC-4603-A589-7422A47A8E4A}"/>
+    </a:ext>
+  </a:extLst>
+</a:theme>
 </file>
</xml_diff>